<commit_message>
22 march changes, fixed plots
</commit_message>
<xml_diff>
--- a/group_leaders_presentation.pptx
+++ b/group_leaders_presentation.pptx
@@ -5,10 +5,10 @@
     <p:sldMasterId id="2147485760" r:id="rId1"/>
   </p:sldMasterIdLst>
   <p:notesMasterIdLst>
-    <p:notesMasterId r:id="rId8"/>
+    <p:notesMasterId r:id="rId10"/>
   </p:notesMasterIdLst>
   <p:handoutMasterIdLst>
-    <p:handoutMasterId r:id="rId9"/>
+    <p:handoutMasterId r:id="rId11"/>
   </p:handoutMasterIdLst>
   <p:sldIdLst>
     <p:sldId id="1495" r:id="rId2"/>
@@ -16,7 +16,9 @@
     <p:sldId id="1888" r:id="rId4"/>
     <p:sldId id="1890" r:id="rId5"/>
     <p:sldId id="1891" r:id="rId6"/>
-    <p:sldId id="1889" r:id="rId7"/>
+    <p:sldId id="1892" r:id="rId7"/>
+    <p:sldId id="1889" r:id="rId8"/>
+    <p:sldId id="1893" r:id="rId9"/>
   </p:sldIdLst>
   <p:sldSz cx="9144000" cy="6858000" type="screen4x3"/>
   <p:notesSz cx="6858000" cy="9144000"/>
@@ -278,7 +280,7 @@
               <a:pPr>
                 <a:defRPr/>
               </a:pPr>
-              <a:t>3/19/21</a:t>
+              <a:t>3/22/21</a:t>
             </a:fld>
             <a:endParaRPr lang="en-US"/>
           </a:p>
@@ -481,7 +483,7 @@
               <a:pPr>
                 <a:defRPr/>
               </a:pPr>
-              <a:t>3/19/21</a:t>
+              <a:t>3/22/21</a:t>
             </a:fld>
             <a:endParaRPr lang="en-US"/>
           </a:p>
@@ -842,10 +844,10 @@
           </a:ln>
           <a:extLst>
             <a:ext uri="{FAA26D3D-D897-4be2-8F04-BA451C77F1D7}">
-              <ma14:placeholderFlag xmlns:ma14="http://schemas.microsoft.com/office/mac/drawingml/2011/main" xmlns="" val="1"/>
+              <ma14:placeholderFlag xmlns="" xmlns:ma14="http://schemas.microsoft.com/office/mac/drawingml/2011/main" val="1"/>
             </a:ext>
             <a:ext uri="{909E8E84-426E-40dd-AFC4-6F175D3DCCD1}">
-              <a14:hiddenFill xmlns="" xmlns:a14="http://schemas.microsoft.com/office/drawing/2010/main">
+              <a14:hiddenFill xmlns:a14="http://schemas.microsoft.com/office/drawing/2010/main" xmlns="">
                 <a:solidFill>
                   <a:srgbClr val="FFFFFF"/>
                 </a:solidFill>
@@ -868,17 +870,17 @@
           <a:noFill/>
           <a:extLst>
             <a:ext uri="{FAA26D3D-D897-4be2-8F04-BA451C77F1D7}">
-              <ma14:placeholderFlag xmlns:ma14="http://schemas.microsoft.com/office/mac/drawingml/2011/main" xmlns="" val="1"/>
+              <ma14:placeholderFlag xmlns="" xmlns:ma14="http://schemas.microsoft.com/office/mac/drawingml/2011/main" val="1"/>
             </a:ext>
             <a:ext uri="{909E8E84-426E-40dd-AFC4-6F175D3DCCD1}">
-              <a14:hiddenFill xmlns="" xmlns:a14="http://schemas.microsoft.com/office/drawing/2010/main">
+              <a14:hiddenFill xmlns:a14="http://schemas.microsoft.com/office/drawing/2010/main" xmlns="">
                 <a:solidFill>
                   <a:srgbClr val="FFFFFF"/>
                 </a:solidFill>
               </a14:hiddenFill>
             </a:ext>
             <a:ext uri="{91240B29-F687-4f45-9708-019B960494DF}">
-              <a14:hiddenLine xmlns="" xmlns:a14="http://schemas.microsoft.com/office/drawing/2010/main" w="9525">
+              <a14:hiddenLine xmlns:a14="http://schemas.microsoft.com/office/drawing/2010/main" xmlns="" w="9525">
                 <a:solidFill>
                   <a:srgbClr val="000000"/>
                 </a:solidFill>
@@ -914,14 +916,14 @@
           <a:noFill/>
           <a:extLst>
             <a:ext uri="{909E8E84-426E-40dd-AFC4-6F175D3DCCD1}">
-              <a14:hiddenFill xmlns="" xmlns:a14="http://schemas.microsoft.com/office/drawing/2010/main">
+              <a14:hiddenFill xmlns:a14="http://schemas.microsoft.com/office/drawing/2010/main" xmlns="">
                 <a:solidFill>
                   <a:srgbClr val="FFFFFF"/>
                 </a:solidFill>
               </a14:hiddenFill>
             </a:ext>
             <a:ext uri="{91240B29-F687-4f45-9708-019B960494DF}">
-              <a14:hiddenLine xmlns="" xmlns:a14="http://schemas.microsoft.com/office/drawing/2010/main" w="9525">
+              <a14:hiddenLine xmlns:a14="http://schemas.microsoft.com/office/drawing/2010/main" xmlns="" w="9525">
                 <a:solidFill>
                   <a:srgbClr val="000000"/>
                 </a:solidFill>
@@ -1259,7 +1261,7 @@
               <a:pPr>
                 <a:defRPr/>
               </a:pPr>
-              <a:t>3/19/21</a:t>
+              <a:t>3/22/21</a:t>
             </a:fld>
             <a:endParaRPr lang="en-US"/>
           </a:p>
@@ -1456,7 +1458,7 @@
               <a:pPr>
                 <a:defRPr/>
               </a:pPr>
-              <a:t>3/19/21</a:t>
+              <a:t>3/22/21</a:t>
             </a:fld>
             <a:endParaRPr lang="en-US"/>
           </a:p>
@@ -1663,7 +1665,7 @@
               <a:pPr>
                 <a:defRPr/>
               </a:pPr>
-              <a:t>3/19/21</a:t>
+              <a:t>3/22/21</a:t>
             </a:fld>
             <a:endParaRPr lang="en-US"/>
           </a:p>
@@ -1875,7 +1877,7 @@
               <a:pPr>
                 <a:defRPr/>
               </a:pPr>
-              <a:t>3/19/21</a:t>
+              <a:t>3/22/21</a:t>
             </a:fld>
             <a:endParaRPr lang="en-US"/>
           </a:p>
@@ -2006,14 +2008,14 @@
           </a:ln>
           <a:extLst>
             <a:ext uri="{909E8E84-426E-40dd-AFC4-6F175D3DCCD1}">
-              <a14:hiddenFill xmlns="" xmlns:a14="http://schemas.microsoft.com/office/drawing/2010/main">
+              <a14:hiddenFill xmlns:a14="http://schemas.microsoft.com/office/drawing/2010/main" xmlns="">
                 <a:solidFill>
                   <a:srgbClr val="FFFFFF"/>
                 </a:solidFill>
               </a14:hiddenFill>
             </a:ext>
             <a:ext uri="{91240B29-F687-4f45-9708-019B960494DF}">
-              <a14:hiddenLine xmlns="" xmlns:a14="http://schemas.microsoft.com/office/drawing/2010/main" w="9525">
+              <a14:hiddenLine xmlns:a14="http://schemas.microsoft.com/office/drawing/2010/main" xmlns="" w="9525">
                 <a:solidFill>
                   <a:srgbClr val="000000"/>
                 </a:solidFill>
@@ -2060,14 +2062,14 @@
           </a:ln>
           <a:extLst>
             <a:ext uri="{909E8E84-426E-40dd-AFC4-6F175D3DCCD1}">
-              <a14:hiddenFill xmlns="" xmlns:a14="http://schemas.microsoft.com/office/drawing/2010/main">
+              <a14:hiddenFill xmlns:a14="http://schemas.microsoft.com/office/drawing/2010/main" xmlns="">
                 <a:solidFill>
                   <a:srgbClr val="FFFFFF"/>
                 </a:solidFill>
               </a14:hiddenFill>
             </a:ext>
             <a:ext uri="{91240B29-F687-4f45-9708-019B960494DF}">
-              <a14:hiddenLine xmlns="" xmlns:a14="http://schemas.microsoft.com/office/drawing/2010/main" w="9525">
+              <a14:hiddenLine xmlns:a14="http://schemas.microsoft.com/office/drawing/2010/main" xmlns="" w="9525">
                 <a:solidFill>
                   <a:srgbClr val="000000"/>
                 </a:solidFill>
@@ -2273,14 +2275,14 @@
           </a:ln>
           <a:extLst>
             <a:ext uri="{909E8E84-426E-40dd-AFC4-6F175D3DCCD1}">
-              <a14:hiddenFill xmlns="" xmlns:a14="http://schemas.microsoft.com/office/drawing/2010/main">
+              <a14:hiddenFill xmlns:a14="http://schemas.microsoft.com/office/drawing/2010/main" xmlns="">
                 <a:solidFill>
                   <a:srgbClr val="FFFFFF"/>
                 </a:solidFill>
               </a14:hiddenFill>
             </a:ext>
             <a:ext uri="{91240B29-F687-4f45-9708-019B960494DF}">
-              <a14:hiddenLine xmlns="" xmlns:a14="http://schemas.microsoft.com/office/drawing/2010/main" w="9525">
+              <a14:hiddenLine xmlns:a14="http://schemas.microsoft.com/office/drawing/2010/main" xmlns="" w="9525">
                 <a:solidFill>
                   <a:srgbClr val="000000"/>
                 </a:solidFill>
@@ -2327,14 +2329,14 @@
           </a:ln>
           <a:extLst>
             <a:ext uri="{909E8E84-426E-40dd-AFC4-6F175D3DCCD1}">
-              <a14:hiddenFill xmlns="" xmlns:a14="http://schemas.microsoft.com/office/drawing/2010/main">
+              <a14:hiddenFill xmlns:a14="http://schemas.microsoft.com/office/drawing/2010/main" xmlns="">
                 <a:solidFill>
                   <a:srgbClr val="FFFFFF"/>
                 </a:solidFill>
               </a14:hiddenFill>
             </a:ext>
             <a:ext uri="{91240B29-F687-4f45-9708-019B960494DF}">
-              <a14:hiddenLine xmlns="" xmlns:a14="http://schemas.microsoft.com/office/drawing/2010/main" w="9525">
+              <a14:hiddenLine xmlns:a14="http://schemas.microsoft.com/office/drawing/2010/main" xmlns="" w="9525">
                 <a:solidFill>
                   <a:srgbClr val="000000"/>
                 </a:solidFill>
@@ -2664,14 +2666,14 @@
           </a:ln>
           <a:extLst>
             <a:ext uri="{909E8E84-426E-40dd-AFC4-6F175D3DCCD1}">
-              <a14:hiddenFill xmlns="" xmlns:a14="http://schemas.microsoft.com/office/drawing/2010/main">
+              <a14:hiddenFill xmlns:a14="http://schemas.microsoft.com/office/drawing/2010/main" xmlns="">
                 <a:solidFill>
                   <a:srgbClr val="FFFFFF"/>
                 </a:solidFill>
               </a14:hiddenFill>
             </a:ext>
             <a:ext uri="{91240B29-F687-4f45-9708-019B960494DF}">
-              <a14:hiddenLine xmlns="" xmlns:a14="http://schemas.microsoft.com/office/drawing/2010/main" w="9525">
+              <a14:hiddenLine xmlns:a14="http://schemas.microsoft.com/office/drawing/2010/main" xmlns="" w="9525">
                 <a:solidFill>
                   <a:srgbClr val="000000"/>
                 </a:solidFill>
@@ -2718,14 +2720,14 @@
           </a:ln>
           <a:extLst>
             <a:ext uri="{909E8E84-426E-40dd-AFC4-6F175D3DCCD1}">
-              <a14:hiddenFill xmlns="" xmlns:a14="http://schemas.microsoft.com/office/drawing/2010/main">
+              <a14:hiddenFill xmlns:a14="http://schemas.microsoft.com/office/drawing/2010/main" xmlns="">
                 <a:solidFill>
                   <a:srgbClr val="FFFFFF"/>
                 </a:solidFill>
               </a14:hiddenFill>
             </a:ext>
             <a:ext uri="{91240B29-F687-4f45-9708-019B960494DF}">
-              <a14:hiddenLine xmlns="" xmlns:a14="http://schemas.microsoft.com/office/drawing/2010/main" w="9525">
+              <a14:hiddenLine xmlns:a14="http://schemas.microsoft.com/office/drawing/2010/main" xmlns="" w="9525">
                 <a:solidFill>
                   <a:srgbClr val="000000"/>
                 </a:solidFill>
@@ -2931,14 +2933,14 @@
           </a:ln>
           <a:extLst>
             <a:ext uri="{909E8E84-426E-40dd-AFC4-6F175D3DCCD1}">
-              <a14:hiddenFill xmlns="" xmlns:a14="http://schemas.microsoft.com/office/drawing/2010/main">
+              <a14:hiddenFill xmlns:a14="http://schemas.microsoft.com/office/drawing/2010/main" xmlns="">
                 <a:solidFill>
                   <a:srgbClr val="FFFFFF"/>
                 </a:solidFill>
               </a14:hiddenFill>
             </a:ext>
             <a:ext uri="{91240B29-F687-4f45-9708-019B960494DF}">
-              <a14:hiddenLine xmlns="" xmlns:a14="http://schemas.microsoft.com/office/drawing/2010/main" w="9525">
+              <a14:hiddenLine xmlns:a14="http://schemas.microsoft.com/office/drawing/2010/main" xmlns="" w="9525">
                 <a:solidFill>
                   <a:srgbClr val="000000"/>
                 </a:solidFill>
@@ -2985,14 +2987,14 @@
           </a:ln>
           <a:extLst>
             <a:ext uri="{909E8E84-426E-40dd-AFC4-6F175D3DCCD1}">
-              <a14:hiddenFill xmlns="" xmlns:a14="http://schemas.microsoft.com/office/drawing/2010/main">
+              <a14:hiddenFill xmlns:a14="http://schemas.microsoft.com/office/drawing/2010/main" xmlns="">
                 <a:solidFill>
                   <a:srgbClr val="FFFFFF"/>
                 </a:solidFill>
               </a14:hiddenFill>
             </a:ext>
             <a:ext uri="{91240B29-F687-4f45-9708-019B960494DF}">
-              <a14:hiddenLine xmlns="" xmlns:a14="http://schemas.microsoft.com/office/drawing/2010/main" w="9525">
+              <a14:hiddenLine xmlns:a14="http://schemas.microsoft.com/office/drawing/2010/main" xmlns="" w="9525">
                 <a:solidFill>
                   <a:srgbClr val="000000"/>
                 </a:solidFill>
@@ -3440,14 +3442,14 @@
           </a:ln>
           <a:extLst>
             <a:ext uri="{909E8E84-426E-40dd-AFC4-6F175D3DCCD1}">
-              <a14:hiddenFill xmlns="" xmlns:a14="http://schemas.microsoft.com/office/drawing/2010/main">
+              <a14:hiddenFill xmlns:a14="http://schemas.microsoft.com/office/drawing/2010/main" xmlns="">
                 <a:solidFill>
                   <a:srgbClr val="FFFFFF"/>
                 </a:solidFill>
               </a14:hiddenFill>
             </a:ext>
             <a:ext uri="{91240B29-F687-4f45-9708-019B960494DF}">
-              <a14:hiddenLine xmlns="" xmlns:a14="http://schemas.microsoft.com/office/drawing/2010/main" w="9525">
+              <a14:hiddenLine xmlns:a14="http://schemas.microsoft.com/office/drawing/2010/main" xmlns="" w="9525">
                 <a:solidFill>
                   <a:srgbClr val="000000"/>
                 </a:solidFill>
@@ -3494,14 +3496,14 @@
           </a:ln>
           <a:extLst>
             <a:ext uri="{909E8E84-426E-40dd-AFC4-6F175D3DCCD1}">
-              <a14:hiddenFill xmlns="" xmlns:a14="http://schemas.microsoft.com/office/drawing/2010/main">
+              <a14:hiddenFill xmlns:a14="http://schemas.microsoft.com/office/drawing/2010/main" xmlns="">
                 <a:solidFill>
                   <a:srgbClr val="FFFFFF"/>
                 </a:solidFill>
               </a14:hiddenFill>
             </a:ext>
             <a:ext uri="{91240B29-F687-4f45-9708-019B960494DF}">
-              <a14:hiddenLine xmlns="" xmlns:a14="http://schemas.microsoft.com/office/drawing/2010/main" w="9525">
+              <a14:hiddenLine xmlns:a14="http://schemas.microsoft.com/office/drawing/2010/main" xmlns="" w="9525">
                 <a:solidFill>
                   <a:srgbClr val="000000"/>
                 </a:solidFill>
@@ -3707,14 +3709,14 @@
           </a:ln>
           <a:extLst>
             <a:ext uri="{909E8E84-426E-40dd-AFC4-6F175D3DCCD1}">
-              <a14:hiddenFill xmlns="" xmlns:a14="http://schemas.microsoft.com/office/drawing/2010/main">
+              <a14:hiddenFill xmlns:a14="http://schemas.microsoft.com/office/drawing/2010/main" xmlns="">
                 <a:solidFill>
                   <a:srgbClr val="FFFFFF"/>
                 </a:solidFill>
               </a14:hiddenFill>
             </a:ext>
             <a:ext uri="{91240B29-F687-4f45-9708-019B960494DF}">
-              <a14:hiddenLine xmlns="" xmlns:a14="http://schemas.microsoft.com/office/drawing/2010/main" w="9525">
+              <a14:hiddenLine xmlns:a14="http://schemas.microsoft.com/office/drawing/2010/main" xmlns="" w="9525">
                 <a:solidFill>
                   <a:srgbClr val="000000"/>
                 </a:solidFill>
@@ -3761,14 +3763,14 @@
           </a:ln>
           <a:extLst>
             <a:ext uri="{909E8E84-426E-40dd-AFC4-6F175D3DCCD1}">
-              <a14:hiddenFill xmlns="" xmlns:a14="http://schemas.microsoft.com/office/drawing/2010/main">
+              <a14:hiddenFill xmlns:a14="http://schemas.microsoft.com/office/drawing/2010/main" xmlns="">
                 <a:solidFill>
                   <a:srgbClr val="FFFFFF"/>
                 </a:solidFill>
               </a14:hiddenFill>
             </a:ext>
             <a:ext uri="{91240B29-F687-4f45-9708-019B960494DF}">
-              <a14:hiddenLine xmlns="" xmlns:a14="http://schemas.microsoft.com/office/drawing/2010/main" w="9525">
+              <a14:hiddenLine xmlns:a14="http://schemas.microsoft.com/office/drawing/2010/main" xmlns="" w="9525">
                 <a:solidFill>
                   <a:srgbClr val="000000"/>
                 </a:solidFill>
@@ -4307,7 +4309,7 @@
               <a:pPr>
                 <a:defRPr/>
               </a:pPr>
-              <a:t>3/19/21</a:t>
+              <a:t>3/22/21</a:t>
             </a:fld>
             <a:endParaRPr lang="en-US"/>
           </a:p>
@@ -4438,14 +4440,14 @@
           </a:ln>
           <a:extLst>
             <a:ext uri="{909E8E84-426E-40dd-AFC4-6F175D3DCCD1}">
-              <a14:hiddenFill xmlns="" xmlns:a14="http://schemas.microsoft.com/office/drawing/2010/main">
+              <a14:hiddenFill xmlns:a14="http://schemas.microsoft.com/office/drawing/2010/main" xmlns="">
                 <a:solidFill>
                   <a:srgbClr val="FFFFFF"/>
                 </a:solidFill>
               </a14:hiddenFill>
             </a:ext>
             <a:ext uri="{91240B29-F687-4f45-9708-019B960494DF}">
-              <a14:hiddenLine xmlns="" xmlns:a14="http://schemas.microsoft.com/office/drawing/2010/main" w="9525">
+              <a14:hiddenLine xmlns:a14="http://schemas.microsoft.com/office/drawing/2010/main" xmlns="" w="9525">
                 <a:solidFill>
                   <a:srgbClr val="000000"/>
                 </a:solidFill>
@@ -4492,14 +4494,14 @@
           </a:ln>
           <a:extLst>
             <a:ext uri="{909E8E84-426E-40dd-AFC4-6F175D3DCCD1}">
-              <a14:hiddenFill xmlns="" xmlns:a14="http://schemas.microsoft.com/office/drawing/2010/main">
+              <a14:hiddenFill xmlns:a14="http://schemas.microsoft.com/office/drawing/2010/main" xmlns="">
                 <a:solidFill>
                   <a:srgbClr val="FFFFFF"/>
                 </a:solidFill>
               </a14:hiddenFill>
             </a:ext>
             <a:ext uri="{91240B29-F687-4f45-9708-019B960494DF}">
-              <a14:hiddenLine xmlns="" xmlns:a14="http://schemas.microsoft.com/office/drawing/2010/main" w="9525">
+              <a14:hiddenLine xmlns:a14="http://schemas.microsoft.com/office/drawing/2010/main" xmlns="" w="9525">
                 <a:solidFill>
                   <a:srgbClr val="000000"/>
                 </a:solidFill>
@@ -4705,14 +4707,14 @@
           </a:ln>
           <a:extLst>
             <a:ext uri="{909E8E84-426E-40dd-AFC4-6F175D3DCCD1}">
-              <a14:hiddenFill xmlns="" xmlns:a14="http://schemas.microsoft.com/office/drawing/2010/main">
+              <a14:hiddenFill xmlns:a14="http://schemas.microsoft.com/office/drawing/2010/main" xmlns="">
                 <a:solidFill>
                   <a:srgbClr val="FFFFFF"/>
                 </a:solidFill>
               </a14:hiddenFill>
             </a:ext>
             <a:ext uri="{91240B29-F687-4f45-9708-019B960494DF}">
-              <a14:hiddenLine xmlns="" xmlns:a14="http://schemas.microsoft.com/office/drawing/2010/main" w="9525">
+              <a14:hiddenLine xmlns:a14="http://schemas.microsoft.com/office/drawing/2010/main" xmlns="" w="9525">
                 <a:solidFill>
                   <a:srgbClr val="000000"/>
                 </a:solidFill>
@@ -4759,14 +4761,14 @@
           </a:ln>
           <a:extLst>
             <a:ext uri="{909E8E84-426E-40dd-AFC4-6F175D3DCCD1}">
-              <a14:hiddenFill xmlns="" xmlns:a14="http://schemas.microsoft.com/office/drawing/2010/main">
+              <a14:hiddenFill xmlns:a14="http://schemas.microsoft.com/office/drawing/2010/main" xmlns="">
                 <a:solidFill>
                   <a:srgbClr val="FFFFFF"/>
                 </a:solidFill>
               </a14:hiddenFill>
             </a:ext>
             <a:ext uri="{91240B29-F687-4f45-9708-019B960494DF}">
-              <a14:hiddenLine xmlns="" xmlns:a14="http://schemas.microsoft.com/office/drawing/2010/main" w="9525">
+              <a14:hiddenLine xmlns:a14="http://schemas.microsoft.com/office/drawing/2010/main" xmlns="" w="9525">
                 <a:solidFill>
                   <a:srgbClr val="000000"/>
                 </a:solidFill>
@@ -5005,7 +5007,7 @@
               <a:pPr>
                 <a:defRPr/>
               </a:pPr>
-              <a:t>3/19/21</a:t>
+              <a:t>3/22/21</a:t>
             </a:fld>
             <a:endParaRPr lang="en-US"/>
           </a:p>
@@ -5136,14 +5138,14 @@
           </a:ln>
           <a:extLst>
             <a:ext uri="{909E8E84-426E-40dd-AFC4-6F175D3DCCD1}">
-              <a14:hiddenFill xmlns="" xmlns:a14="http://schemas.microsoft.com/office/drawing/2010/main">
+              <a14:hiddenFill xmlns:a14="http://schemas.microsoft.com/office/drawing/2010/main" xmlns="">
                 <a:solidFill>
                   <a:srgbClr val="FFFFFF"/>
                 </a:solidFill>
               </a14:hiddenFill>
             </a:ext>
             <a:ext uri="{91240B29-F687-4f45-9708-019B960494DF}">
-              <a14:hiddenLine xmlns="" xmlns:a14="http://schemas.microsoft.com/office/drawing/2010/main" w="9525">
+              <a14:hiddenLine xmlns:a14="http://schemas.microsoft.com/office/drawing/2010/main" xmlns="" w="9525">
                 <a:solidFill>
                   <a:srgbClr val="000000"/>
                 </a:solidFill>
@@ -5190,14 +5192,14 @@
           </a:ln>
           <a:extLst>
             <a:ext uri="{909E8E84-426E-40dd-AFC4-6F175D3DCCD1}">
-              <a14:hiddenFill xmlns="" xmlns:a14="http://schemas.microsoft.com/office/drawing/2010/main">
+              <a14:hiddenFill xmlns:a14="http://schemas.microsoft.com/office/drawing/2010/main" xmlns="">
                 <a:solidFill>
                   <a:srgbClr val="FFFFFF"/>
                 </a:solidFill>
               </a14:hiddenFill>
             </a:ext>
             <a:ext uri="{91240B29-F687-4f45-9708-019B960494DF}">
-              <a14:hiddenLine xmlns="" xmlns:a14="http://schemas.microsoft.com/office/drawing/2010/main" w="9525">
+              <a14:hiddenLine xmlns:a14="http://schemas.microsoft.com/office/drawing/2010/main" xmlns="" w="9525">
                 <a:solidFill>
                   <a:srgbClr val="000000"/>
                 </a:solidFill>
@@ -5527,14 +5529,14 @@
           </a:ln>
           <a:extLst>
             <a:ext uri="{909E8E84-426E-40dd-AFC4-6F175D3DCCD1}">
-              <a14:hiddenFill xmlns="" xmlns:a14="http://schemas.microsoft.com/office/drawing/2010/main">
+              <a14:hiddenFill xmlns:a14="http://schemas.microsoft.com/office/drawing/2010/main" xmlns="">
                 <a:solidFill>
                   <a:srgbClr val="FFFFFF"/>
                 </a:solidFill>
               </a14:hiddenFill>
             </a:ext>
             <a:ext uri="{91240B29-F687-4f45-9708-019B960494DF}">
-              <a14:hiddenLine xmlns="" xmlns:a14="http://schemas.microsoft.com/office/drawing/2010/main" w="9525">
+              <a14:hiddenLine xmlns:a14="http://schemas.microsoft.com/office/drawing/2010/main" xmlns="" w="9525">
                 <a:solidFill>
                   <a:srgbClr val="000000"/>
                 </a:solidFill>
@@ -5581,14 +5583,14 @@
           </a:ln>
           <a:extLst>
             <a:ext uri="{909E8E84-426E-40dd-AFC4-6F175D3DCCD1}">
-              <a14:hiddenFill xmlns="" xmlns:a14="http://schemas.microsoft.com/office/drawing/2010/main">
+              <a14:hiddenFill xmlns:a14="http://schemas.microsoft.com/office/drawing/2010/main" xmlns="">
                 <a:solidFill>
                   <a:srgbClr val="FFFFFF"/>
                 </a:solidFill>
               </a14:hiddenFill>
             </a:ext>
             <a:ext uri="{91240B29-F687-4f45-9708-019B960494DF}">
-              <a14:hiddenLine xmlns="" xmlns:a14="http://schemas.microsoft.com/office/drawing/2010/main" w="9525">
+              <a14:hiddenLine xmlns:a14="http://schemas.microsoft.com/office/drawing/2010/main" xmlns="" w="9525">
                 <a:solidFill>
                   <a:srgbClr val="000000"/>
                 </a:solidFill>
@@ -6036,14 +6038,14 @@
           </a:ln>
           <a:extLst>
             <a:ext uri="{909E8E84-426E-40dd-AFC4-6F175D3DCCD1}">
-              <a14:hiddenFill xmlns="" xmlns:a14="http://schemas.microsoft.com/office/drawing/2010/main">
+              <a14:hiddenFill xmlns:a14="http://schemas.microsoft.com/office/drawing/2010/main" xmlns="">
                 <a:solidFill>
                   <a:srgbClr val="FFFFFF"/>
                 </a:solidFill>
               </a14:hiddenFill>
             </a:ext>
             <a:ext uri="{91240B29-F687-4f45-9708-019B960494DF}">
-              <a14:hiddenLine xmlns="" xmlns:a14="http://schemas.microsoft.com/office/drawing/2010/main" w="9525">
+              <a14:hiddenLine xmlns:a14="http://schemas.microsoft.com/office/drawing/2010/main" xmlns="" w="9525">
                 <a:solidFill>
                   <a:srgbClr val="000000"/>
                 </a:solidFill>
@@ -6090,14 +6092,14 @@
           </a:ln>
           <a:extLst>
             <a:ext uri="{909E8E84-426E-40dd-AFC4-6F175D3DCCD1}">
-              <a14:hiddenFill xmlns="" xmlns:a14="http://schemas.microsoft.com/office/drawing/2010/main">
+              <a14:hiddenFill xmlns:a14="http://schemas.microsoft.com/office/drawing/2010/main" xmlns="">
                 <a:solidFill>
                   <a:srgbClr val="FFFFFF"/>
                 </a:solidFill>
               </a14:hiddenFill>
             </a:ext>
             <a:ext uri="{91240B29-F687-4f45-9708-019B960494DF}">
-              <a14:hiddenLine xmlns="" xmlns:a14="http://schemas.microsoft.com/office/drawing/2010/main" w="9525">
+              <a14:hiddenLine xmlns:a14="http://schemas.microsoft.com/office/drawing/2010/main" xmlns="" w="9525">
                 <a:solidFill>
                   <a:srgbClr val="000000"/>
                 </a:solidFill>
@@ -6636,7 +6638,7 @@
               <a:pPr>
                 <a:defRPr/>
               </a:pPr>
-              <a:t>3/19/21</a:t>
+              <a:t>3/22/21</a:t>
             </a:fld>
             <a:endParaRPr lang="en-US"/>
           </a:p>
@@ -6831,14 +6833,14 @@
           </a:ln>
           <a:extLst>
             <a:ext uri="{909E8E84-426E-40dd-AFC4-6F175D3DCCD1}">
-              <a14:hiddenFill xmlns="" xmlns:a14="http://schemas.microsoft.com/office/drawing/2010/main">
+              <a14:hiddenFill xmlns:a14="http://schemas.microsoft.com/office/drawing/2010/main" xmlns="">
                 <a:solidFill>
                   <a:srgbClr val="FFFFFF"/>
                 </a:solidFill>
               </a14:hiddenFill>
             </a:ext>
             <a:ext uri="{91240B29-F687-4f45-9708-019B960494DF}">
-              <a14:hiddenLine xmlns="" xmlns:a14="http://schemas.microsoft.com/office/drawing/2010/main" w="9525">
+              <a14:hiddenLine xmlns:a14="http://schemas.microsoft.com/office/drawing/2010/main" xmlns="" w="9525">
                 <a:solidFill>
                   <a:srgbClr val="000000"/>
                 </a:solidFill>
@@ -6885,14 +6887,14 @@
           </a:ln>
           <a:extLst>
             <a:ext uri="{909E8E84-426E-40dd-AFC4-6F175D3DCCD1}">
-              <a14:hiddenFill xmlns="" xmlns:a14="http://schemas.microsoft.com/office/drawing/2010/main">
+              <a14:hiddenFill xmlns:a14="http://schemas.microsoft.com/office/drawing/2010/main" xmlns="">
                 <a:solidFill>
                   <a:srgbClr val="FFFFFF"/>
                 </a:solidFill>
               </a14:hiddenFill>
             </a:ext>
             <a:ext uri="{91240B29-F687-4f45-9708-019B960494DF}">
-              <a14:hiddenLine xmlns="" xmlns:a14="http://schemas.microsoft.com/office/drawing/2010/main" w="9525">
+              <a14:hiddenLine xmlns:a14="http://schemas.microsoft.com/office/drawing/2010/main" xmlns="" w="9525">
                 <a:solidFill>
                   <a:srgbClr val="000000"/>
                 </a:solidFill>
@@ -7028,14 +7030,14 @@
           </a:ln>
           <a:extLst>
             <a:ext uri="{909E8E84-426E-40dd-AFC4-6F175D3DCCD1}">
-              <a14:hiddenFill xmlns="" xmlns:a14="http://schemas.microsoft.com/office/drawing/2010/main">
+              <a14:hiddenFill xmlns:a14="http://schemas.microsoft.com/office/drawing/2010/main" xmlns="">
                 <a:solidFill>
                   <a:srgbClr val="FFFFFF"/>
                 </a:solidFill>
               </a14:hiddenFill>
             </a:ext>
             <a:ext uri="{91240B29-F687-4f45-9708-019B960494DF}">
-              <a14:hiddenLine xmlns="" xmlns:a14="http://schemas.microsoft.com/office/drawing/2010/main" w="9525">
+              <a14:hiddenLine xmlns:a14="http://schemas.microsoft.com/office/drawing/2010/main" xmlns="" w="9525">
                 <a:solidFill>
                   <a:srgbClr val="000000"/>
                 </a:solidFill>
@@ -7523,14 +7525,14 @@
           </a:ln>
           <a:extLst>
             <a:ext uri="{909E8E84-426E-40dd-AFC4-6F175D3DCCD1}">
-              <a14:hiddenFill xmlns="" xmlns:a14="http://schemas.microsoft.com/office/drawing/2010/main">
+              <a14:hiddenFill xmlns:a14="http://schemas.microsoft.com/office/drawing/2010/main" xmlns="">
                 <a:solidFill>
                   <a:srgbClr val="FFFFFF"/>
                 </a:solidFill>
               </a14:hiddenFill>
             </a:ext>
             <a:ext uri="{91240B29-F687-4f45-9708-019B960494DF}">
-              <a14:hiddenLine xmlns="" xmlns:a14="http://schemas.microsoft.com/office/drawing/2010/main" w="9525">
+              <a14:hiddenLine xmlns:a14="http://schemas.microsoft.com/office/drawing/2010/main" xmlns="" w="9525">
                 <a:solidFill>
                   <a:srgbClr val="000000"/>
                 </a:solidFill>
@@ -7577,14 +7579,14 @@
           </a:ln>
           <a:extLst>
             <a:ext uri="{909E8E84-426E-40dd-AFC4-6F175D3DCCD1}">
-              <a14:hiddenFill xmlns="" xmlns:a14="http://schemas.microsoft.com/office/drawing/2010/main">
+              <a14:hiddenFill xmlns:a14="http://schemas.microsoft.com/office/drawing/2010/main" xmlns="">
                 <a:solidFill>
                   <a:srgbClr val="FFFFFF"/>
                 </a:solidFill>
               </a14:hiddenFill>
             </a:ext>
             <a:ext uri="{91240B29-F687-4f45-9708-019B960494DF}">
-              <a14:hiddenLine xmlns="" xmlns:a14="http://schemas.microsoft.com/office/drawing/2010/main" w="9525">
+              <a14:hiddenLine xmlns:a14="http://schemas.microsoft.com/office/drawing/2010/main" xmlns="" w="9525">
                 <a:solidFill>
                   <a:srgbClr val="000000"/>
                 </a:solidFill>
@@ -7823,7 +7825,7 @@
               <a:pPr>
                 <a:defRPr/>
               </a:pPr>
-              <a:t>3/19/21</a:t>
+              <a:t>3/22/21</a:t>
             </a:fld>
             <a:endParaRPr lang="en-US"/>
           </a:p>
@@ -8153,7 +8155,7 @@
               <a:pPr>
                 <a:defRPr/>
               </a:pPr>
-              <a:t>3/19/21</a:t>
+              <a:t>3/22/21</a:t>
             </a:fld>
             <a:endParaRPr lang="en-US"/>
           </a:p>
@@ -8347,14 +8349,14 @@
           </a:ln>
           <a:extLst>
             <a:ext uri="{909E8E84-426E-40dd-AFC4-6F175D3DCCD1}">
-              <a14:hiddenFill xmlns="" xmlns:a14="http://schemas.microsoft.com/office/drawing/2010/main">
+              <a14:hiddenFill xmlns:a14="http://schemas.microsoft.com/office/drawing/2010/main" xmlns="">
                 <a:solidFill>
                   <a:srgbClr val="FFFFFF"/>
                 </a:solidFill>
               </a14:hiddenFill>
             </a:ext>
             <a:ext uri="{91240B29-F687-4f45-9708-019B960494DF}">
-              <a14:hiddenLine xmlns="" xmlns:a14="http://schemas.microsoft.com/office/drawing/2010/main" w="9525">
+              <a14:hiddenLine xmlns:a14="http://schemas.microsoft.com/office/drawing/2010/main" xmlns="" w="9525">
                 <a:solidFill>
                   <a:srgbClr val="000000"/>
                 </a:solidFill>
@@ -8401,14 +8403,14 @@
           </a:ln>
           <a:extLst>
             <a:ext uri="{909E8E84-426E-40dd-AFC4-6F175D3DCCD1}">
-              <a14:hiddenFill xmlns="" xmlns:a14="http://schemas.microsoft.com/office/drawing/2010/main">
+              <a14:hiddenFill xmlns:a14="http://schemas.microsoft.com/office/drawing/2010/main" xmlns="">
                 <a:solidFill>
                   <a:srgbClr val="FFFFFF"/>
                 </a:solidFill>
               </a14:hiddenFill>
             </a:ext>
             <a:ext uri="{91240B29-F687-4f45-9708-019B960494DF}">
-              <a14:hiddenLine xmlns="" xmlns:a14="http://schemas.microsoft.com/office/drawing/2010/main" w="9525">
+              <a14:hiddenLine xmlns:a14="http://schemas.microsoft.com/office/drawing/2010/main" xmlns="" w="9525">
                 <a:solidFill>
                   <a:srgbClr val="000000"/>
                 </a:solidFill>
@@ -8544,14 +8546,14 @@
           </a:ln>
           <a:extLst>
             <a:ext uri="{909E8E84-426E-40dd-AFC4-6F175D3DCCD1}">
-              <a14:hiddenFill xmlns="" xmlns:a14="http://schemas.microsoft.com/office/drawing/2010/main">
+              <a14:hiddenFill xmlns:a14="http://schemas.microsoft.com/office/drawing/2010/main" xmlns="">
                 <a:solidFill>
                   <a:srgbClr val="FFFFFF"/>
                 </a:solidFill>
               </a14:hiddenFill>
             </a:ext>
             <a:ext uri="{91240B29-F687-4f45-9708-019B960494DF}">
-              <a14:hiddenLine xmlns="" xmlns:a14="http://schemas.microsoft.com/office/drawing/2010/main" w="9525">
+              <a14:hiddenLine xmlns:a14="http://schemas.microsoft.com/office/drawing/2010/main" xmlns="" w="9525">
                 <a:solidFill>
                   <a:srgbClr val="000000"/>
                 </a:solidFill>
@@ -9221,14 +9223,14 @@
           </a:ln>
           <a:extLst>
             <a:ext uri="{909E8E84-426E-40dd-AFC4-6F175D3DCCD1}">
-              <a14:hiddenFill xmlns="" xmlns:a14="http://schemas.microsoft.com/office/drawing/2010/main">
+              <a14:hiddenFill xmlns:a14="http://schemas.microsoft.com/office/drawing/2010/main" xmlns="">
                 <a:solidFill>
                   <a:srgbClr val="FFFFFF"/>
                 </a:solidFill>
               </a14:hiddenFill>
             </a:ext>
             <a:ext uri="{91240B29-F687-4f45-9708-019B960494DF}">
-              <a14:hiddenLine xmlns="" xmlns:a14="http://schemas.microsoft.com/office/drawing/2010/main" w="9525">
+              <a14:hiddenLine xmlns:a14="http://schemas.microsoft.com/office/drawing/2010/main" xmlns="" w="9525">
                 <a:solidFill>
                   <a:srgbClr val="000000"/>
                 </a:solidFill>
@@ -9275,14 +9277,14 @@
           </a:ln>
           <a:extLst>
             <a:ext uri="{909E8E84-426E-40dd-AFC4-6F175D3DCCD1}">
-              <a14:hiddenFill xmlns="" xmlns:a14="http://schemas.microsoft.com/office/drawing/2010/main">
+              <a14:hiddenFill xmlns:a14="http://schemas.microsoft.com/office/drawing/2010/main" xmlns="">
                 <a:solidFill>
                   <a:srgbClr val="FFFFFF"/>
                 </a:solidFill>
               </a14:hiddenFill>
             </a:ext>
             <a:ext uri="{91240B29-F687-4f45-9708-019B960494DF}">
-              <a14:hiddenLine xmlns="" xmlns:a14="http://schemas.microsoft.com/office/drawing/2010/main" w="9525">
+              <a14:hiddenLine xmlns:a14="http://schemas.microsoft.com/office/drawing/2010/main" xmlns="" w="9525">
                 <a:solidFill>
                   <a:srgbClr val="000000"/>
                 </a:solidFill>
@@ -9418,14 +9420,14 @@
           </a:ln>
           <a:extLst>
             <a:ext uri="{909E8E84-426E-40dd-AFC4-6F175D3DCCD1}">
-              <a14:hiddenFill xmlns="" xmlns:a14="http://schemas.microsoft.com/office/drawing/2010/main">
+              <a14:hiddenFill xmlns:a14="http://schemas.microsoft.com/office/drawing/2010/main" xmlns="">
                 <a:solidFill>
                   <a:srgbClr val="FFFFFF"/>
                 </a:solidFill>
               </a14:hiddenFill>
             </a:ext>
             <a:ext uri="{91240B29-F687-4f45-9708-019B960494DF}">
-              <a14:hiddenLine xmlns="" xmlns:a14="http://schemas.microsoft.com/office/drawing/2010/main" w="9525">
+              <a14:hiddenLine xmlns:a14="http://schemas.microsoft.com/office/drawing/2010/main" xmlns="" w="9525">
                 <a:solidFill>
                   <a:srgbClr val="000000"/>
                 </a:solidFill>
@@ -10123,7 +10125,7 @@
               <a:pPr>
                 <a:defRPr/>
               </a:pPr>
-              <a:t>3/19/21</a:t>
+              <a:t>3/22/21</a:t>
             </a:fld>
             <a:endParaRPr lang="en-US"/>
           </a:p>
@@ -10317,14 +10319,14 @@
           </a:ln>
           <a:extLst>
             <a:ext uri="{909E8E84-426E-40dd-AFC4-6F175D3DCCD1}">
-              <a14:hiddenFill xmlns="" xmlns:a14="http://schemas.microsoft.com/office/drawing/2010/main">
+              <a14:hiddenFill xmlns:a14="http://schemas.microsoft.com/office/drawing/2010/main" xmlns="">
                 <a:solidFill>
                   <a:srgbClr val="FFFFFF"/>
                 </a:solidFill>
               </a14:hiddenFill>
             </a:ext>
             <a:ext uri="{91240B29-F687-4f45-9708-019B960494DF}">
-              <a14:hiddenLine xmlns="" xmlns:a14="http://schemas.microsoft.com/office/drawing/2010/main" w="9525">
+              <a14:hiddenLine xmlns:a14="http://schemas.microsoft.com/office/drawing/2010/main" xmlns="" w="9525">
                 <a:solidFill>
                   <a:srgbClr val="000000"/>
                 </a:solidFill>
@@ -10371,14 +10373,14 @@
           </a:ln>
           <a:extLst>
             <a:ext uri="{909E8E84-426E-40dd-AFC4-6F175D3DCCD1}">
-              <a14:hiddenFill xmlns="" xmlns:a14="http://schemas.microsoft.com/office/drawing/2010/main">
+              <a14:hiddenFill xmlns:a14="http://schemas.microsoft.com/office/drawing/2010/main" xmlns="">
                 <a:solidFill>
                   <a:srgbClr val="FFFFFF"/>
                 </a:solidFill>
               </a14:hiddenFill>
             </a:ext>
             <a:ext uri="{91240B29-F687-4f45-9708-019B960494DF}">
-              <a14:hiddenLine xmlns="" xmlns:a14="http://schemas.microsoft.com/office/drawing/2010/main" w="9525">
+              <a14:hiddenLine xmlns:a14="http://schemas.microsoft.com/office/drawing/2010/main" xmlns="" w="9525">
                 <a:solidFill>
                   <a:srgbClr val="000000"/>
                 </a:solidFill>
@@ -10514,14 +10516,14 @@
           </a:ln>
           <a:extLst>
             <a:ext uri="{909E8E84-426E-40dd-AFC4-6F175D3DCCD1}">
-              <a14:hiddenFill xmlns="" xmlns:a14="http://schemas.microsoft.com/office/drawing/2010/main">
+              <a14:hiddenFill xmlns:a14="http://schemas.microsoft.com/office/drawing/2010/main" xmlns="">
                 <a:solidFill>
                   <a:srgbClr val="FFFFFF"/>
                 </a:solidFill>
               </a14:hiddenFill>
             </a:ext>
             <a:ext uri="{91240B29-F687-4f45-9708-019B960494DF}">
-              <a14:hiddenLine xmlns="" xmlns:a14="http://schemas.microsoft.com/office/drawing/2010/main" w="9525">
+              <a14:hiddenLine xmlns:a14="http://schemas.microsoft.com/office/drawing/2010/main" xmlns="" w="9525">
                 <a:solidFill>
                   <a:srgbClr val="000000"/>
                 </a:solidFill>
@@ -10919,7 +10921,7 @@
               <a:pPr>
                 <a:defRPr/>
               </a:pPr>
-              <a:t>3/19/21</a:t>
+              <a:t>3/22/21</a:t>
             </a:fld>
             <a:endParaRPr lang="en-US"/>
           </a:p>
@@ -11041,7 +11043,7 @@
               <a:pPr>
                 <a:defRPr/>
               </a:pPr>
-              <a:t>3/19/21</a:t>
+              <a:t>3/22/21</a:t>
             </a:fld>
             <a:endParaRPr lang="en-US"/>
           </a:p>
@@ -11171,14 +11173,14 @@
           </a:ln>
           <a:extLst>
             <a:ext uri="{909E8E84-426E-40dd-AFC4-6F175D3DCCD1}">
-              <a14:hiddenFill xmlns="" xmlns:a14="http://schemas.microsoft.com/office/drawing/2010/main">
+              <a14:hiddenFill xmlns:a14="http://schemas.microsoft.com/office/drawing/2010/main" xmlns="">
                 <a:solidFill>
                   <a:srgbClr val="FFFFFF"/>
                 </a:solidFill>
               </a14:hiddenFill>
             </a:ext>
             <a:ext uri="{91240B29-F687-4f45-9708-019B960494DF}">
-              <a14:hiddenLine xmlns="" xmlns:a14="http://schemas.microsoft.com/office/drawing/2010/main" w="9525">
+              <a14:hiddenLine xmlns:a14="http://schemas.microsoft.com/office/drawing/2010/main" xmlns="" w="9525">
                 <a:solidFill>
                   <a:srgbClr val="000000"/>
                 </a:solidFill>
@@ -11225,14 +11227,14 @@
           </a:ln>
           <a:extLst>
             <a:ext uri="{909E8E84-426E-40dd-AFC4-6F175D3DCCD1}">
-              <a14:hiddenFill xmlns="" xmlns:a14="http://schemas.microsoft.com/office/drawing/2010/main">
+              <a14:hiddenFill xmlns:a14="http://schemas.microsoft.com/office/drawing/2010/main" xmlns="">
                 <a:solidFill>
                   <a:srgbClr val="FFFFFF"/>
                 </a:solidFill>
               </a14:hiddenFill>
             </a:ext>
             <a:ext uri="{91240B29-F687-4f45-9708-019B960494DF}">
-              <a14:hiddenLine xmlns="" xmlns:a14="http://schemas.microsoft.com/office/drawing/2010/main" w="9525">
+              <a14:hiddenLine xmlns:a14="http://schemas.microsoft.com/office/drawing/2010/main" xmlns="" w="9525">
                 <a:solidFill>
                   <a:srgbClr val="000000"/>
                 </a:solidFill>
@@ -11438,14 +11440,14 @@
           </a:ln>
           <a:extLst>
             <a:ext uri="{909E8E84-426E-40dd-AFC4-6F175D3DCCD1}">
-              <a14:hiddenFill xmlns="" xmlns:a14="http://schemas.microsoft.com/office/drawing/2010/main">
+              <a14:hiddenFill xmlns:a14="http://schemas.microsoft.com/office/drawing/2010/main" xmlns="">
                 <a:solidFill>
                   <a:srgbClr val="FFFFFF"/>
                 </a:solidFill>
               </a14:hiddenFill>
             </a:ext>
             <a:ext uri="{91240B29-F687-4f45-9708-019B960494DF}">
-              <a14:hiddenLine xmlns="" xmlns:a14="http://schemas.microsoft.com/office/drawing/2010/main" w="9525">
+              <a14:hiddenLine xmlns:a14="http://schemas.microsoft.com/office/drawing/2010/main" xmlns="" w="9525">
                 <a:solidFill>
                   <a:srgbClr val="000000"/>
                 </a:solidFill>
@@ -11492,14 +11494,14 @@
           </a:ln>
           <a:extLst>
             <a:ext uri="{909E8E84-426E-40dd-AFC4-6F175D3DCCD1}">
-              <a14:hiddenFill xmlns="" xmlns:a14="http://schemas.microsoft.com/office/drawing/2010/main">
+              <a14:hiddenFill xmlns:a14="http://schemas.microsoft.com/office/drawing/2010/main" xmlns="">
                 <a:solidFill>
                   <a:srgbClr val="FFFFFF"/>
                 </a:solidFill>
               </a14:hiddenFill>
             </a:ext>
             <a:ext uri="{91240B29-F687-4f45-9708-019B960494DF}">
-              <a14:hiddenLine xmlns="" xmlns:a14="http://schemas.microsoft.com/office/drawing/2010/main" w="9525">
+              <a14:hiddenLine xmlns:a14="http://schemas.microsoft.com/office/drawing/2010/main" xmlns="" w="9525">
                 <a:solidFill>
                   <a:srgbClr val="000000"/>
                 </a:solidFill>
@@ -11879,7 +11881,7 @@
               <a:pPr>
                 <a:defRPr/>
               </a:pPr>
-              <a:t>3/19/21</a:t>
+              <a:t>3/22/21</a:t>
             </a:fld>
             <a:endParaRPr lang="en-US"/>
           </a:p>
@@ -12168,14 +12170,14 @@
           </a:ln>
           <a:extLst>
             <a:ext uri="{909E8E84-426E-40dd-AFC4-6F175D3DCCD1}">
-              <a14:hiddenFill xmlns="" xmlns:a14="http://schemas.microsoft.com/office/drawing/2010/main">
+              <a14:hiddenFill xmlns:a14="http://schemas.microsoft.com/office/drawing/2010/main" xmlns="">
                 <a:solidFill>
                   <a:srgbClr val="FFFFFF"/>
                 </a:solidFill>
               </a14:hiddenFill>
             </a:ext>
             <a:ext uri="{91240B29-F687-4f45-9708-019B960494DF}">
-              <a14:hiddenLine xmlns="" xmlns:a14="http://schemas.microsoft.com/office/drawing/2010/main" w="9525">
+              <a14:hiddenLine xmlns:a14="http://schemas.microsoft.com/office/drawing/2010/main" xmlns="" w="9525">
                 <a:solidFill>
                   <a:srgbClr val="000000"/>
                 </a:solidFill>
@@ -12222,14 +12224,14 @@
           </a:ln>
           <a:extLst>
             <a:ext uri="{909E8E84-426E-40dd-AFC4-6F175D3DCCD1}">
-              <a14:hiddenFill xmlns="" xmlns:a14="http://schemas.microsoft.com/office/drawing/2010/main">
+              <a14:hiddenFill xmlns:a14="http://schemas.microsoft.com/office/drawing/2010/main" xmlns="">
                 <a:solidFill>
                   <a:srgbClr val="FFFFFF"/>
                 </a:solidFill>
               </a14:hiddenFill>
             </a:ext>
             <a:ext uri="{91240B29-F687-4f45-9708-019B960494DF}">
-              <a14:hiddenLine xmlns="" xmlns:a14="http://schemas.microsoft.com/office/drawing/2010/main" w="9525">
+              <a14:hiddenLine xmlns:a14="http://schemas.microsoft.com/office/drawing/2010/main" xmlns="" w="9525">
                 <a:solidFill>
                   <a:srgbClr val="000000"/>
                 </a:solidFill>
@@ -12276,14 +12278,14 @@
           </a:ln>
           <a:extLst>
             <a:ext uri="{909E8E84-426E-40dd-AFC4-6F175D3DCCD1}">
-              <a14:hiddenFill xmlns="" xmlns:a14="http://schemas.microsoft.com/office/drawing/2010/main">
+              <a14:hiddenFill xmlns:a14="http://schemas.microsoft.com/office/drawing/2010/main" xmlns="">
                 <a:solidFill>
                   <a:srgbClr val="FFFFFF"/>
                 </a:solidFill>
               </a14:hiddenFill>
             </a:ext>
             <a:ext uri="{91240B29-F687-4f45-9708-019B960494DF}">
-              <a14:hiddenLine xmlns="" xmlns:a14="http://schemas.microsoft.com/office/drawing/2010/main" w="9525">
+              <a14:hiddenLine xmlns:a14="http://schemas.microsoft.com/office/drawing/2010/main" xmlns="" w="9525">
                 <a:solidFill>
                   <a:srgbClr val="000000"/>
                 </a:solidFill>
@@ -12489,14 +12491,14 @@
           </a:ln>
           <a:extLst>
             <a:ext uri="{909E8E84-426E-40dd-AFC4-6F175D3DCCD1}">
-              <a14:hiddenFill xmlns="" xmlns:a14="http://schemas.microsoft.com/office/drawing/2010/main">
+              <a14:hiddenFill xmlns:a14="http://schemas.microsoft.com/office/drawing/2010/main" xmlns="">
                 <a:solidFill>
                   <a:srgbClr val="FFFFFF"/>
                 </a:solidFill>
               </a14:hiddenFill>
             </a:ext>
             <a:ext uri="{91240B29-F687-4f45-9708-019B960494DF}">
-              <a14:hiddenLine xmlns="" xmlns:a14="http://schemas.microsoft.com/office/drawing/2010/main" w="9525">
+              <a14:hiddenLine xmlns:a14="http://schemas.microsoft.com/office/drawing/2010/main" xmlns="" w="9525">
                 <a:solidFill>
                   <a:srgbClr val="000000"/>
                 </a:solidFill>
@@ -12543,14 +12545,14 @@
           </a:ln>
           <a:extLst>
             <a:ext uri="{909E8E84-426E-40dd-AFC4-6F175D3DCCD1}">
-              <a14:hiddenFill xmlns="" xmlns:a14="http://schemas.microsoft.com/office/drawing/2010/main">
+              <a14:hiddenFill xmlns:a14="http://schemas.microsoft.com/office/drawing/2010/main" xmlns="">
                 <a:solidFill>
                   <a:srgbClr val="FFFFFF"/>
                 </a:solidFill>
               </a14:hiddenFill>
             </a:ext>
             <a:ext uri="{91240B29-F687-4f45-9708-019B960494DF}">
-              <a14:hiddenLine xmlns="" xmlns:a14="http://schemas.microsoft.com/office/drawing/2010/main" w="9525">
+              <a14:hiddenLine xmlns:a14="http://schemas.microsoft.com/office/drawing/2010/main" xmlns="" w="9525">
                 <a:solidFill>
                   <a:srgbClr val="000000"/>
                 </a:solidFill>
@@ -12949,17 +12951,17 @@
           </a:ln>
           <a:extLst>
             <a:ext uri="{FAA26D3D-D897-4be2-8F04-BA451C77F1D7}">
-              <ma14:placeholderFlag xmlns:ma14="http://schemas.microsoft.com/office/mac/drawingml/2011/main" xmlns="" val="1"/>
+              <ma14:placeholderFlag xmlns="" xmlns:ma14="http://schemas.microsoft.com/office/mac/drawingml/2011/main" val="1"/>
             </a:ext>
             <a:ext uri="{909E8E84-426E-40dd-AFC4-6F175D3DCCD1}">
-              <a14:hiddenFill xmlns="" xmlns:a14="http://schemas.microsoft.com/office/drawing/2010/main">
+              <a14:hiddenFill xmlns:a14="http://schemas.microsoft.com/office/drawing/2010/main" xmlns="">
                 <a:solidFill>
                   <a:srgbClr val="FFFFFF"/>
                 </a:solidFill>
               </a14:hiddenFill>
             </a:ext>
             <a:ext uri="{91240B29-F687-4f45-9708-019B960494DF}">
-              <a14:hiddenLine xmlns="" xmlns:a14="http://schemas.microsoft.com/office/drawing/2010/main" w="9525">
+              <a14:hiddenLine xmlns:a14="http://schemas.microsoft.com/office/drawing/2010/main" xmlns="" w="9525">
                 <a:solidFill>
                   <a:srgbClr val="000000"/>
                 </a:solidFill>
@@ -13011,17 +13013,17 @@
           </a:ln>
           <a:extLst>
             <a:ext uri="{FAA26D3D-D897-4be2-8F04-BA451C77F1D7}">
-              <ma14:placeholderFlag xmlns:ma14="http://schemas.microsoft.com/office/mac/drawingml/2011/main" xmlns="" val="1"/>
+              <ma14:placeholderFlag xmlns="" xmlns:ma14="http://schemas.microsoft.com/office/mac/drawingml/2011/main" val="1"/>
             </a:ext>
             <a:ext uri="{909E8E84-426E-40dd-AFC4-6F175D3DCCD1}">
-              <a14:hiddenFill xmlns="" xmlns:a14="http://schemas.microsoft.com/office/drawing/2010/main">
+              <a14:hiddenFill xmlns:a14="http://schemas.microsoft.com/office/drawing/2010/main" xmlns="">
                 <a:solidFill>
                   <a:srgbClr val="FFFFFF"/>
                 </a:solidFill>
               </a14:hiddenFill>
             </a:ext>
             <a:ext uri="{91240B29-F687-4f45-9708-019B960494DF}">
-              <a14:hiddenLine xmlns="" xmlns:a14="http://schemas.microsoft.com/office/drawing/2010/main" w="9525">
+              <a14:hiddenLine xmlns:a14="http://schemas.microsoft.com/office/drawing/2010/main" xmlns="" w="9525">
                 <a:solidFill>
                   <a:srgbClr val="000000"/>
                 </a:solidFill>
@@ -13120,7 +13122,7 @@
               <a:pPr>
                 <a:defRPr/>
               </a:pPr>
-              <a:t>3/19/21</a:t>
+              <a:t>3/22/21</a:t>
             </a:fld>
             <a:endParaRPr lang="en-US"/>
           </a:p>
@@ -13764,7 +13766,7 @@
           <a:p>
             <a:r>
               <a:rPr lang="en-US" sz="3600" dirty="0"/>
-              <a:t>CCB-VIB Bioinformatic Platform</a:t>
+              <a:t>CCB-VIB Bioinformatics Platform</a:t>
             </a:r>
             <a:br>
               <a:rPr lang="en-US" sz="3600" dirty="0"/>
@@ -13895,14 +13897,14 @@
           </a:ln>
           <a:extLst>
             <a:ext uri="{909E8E84-426E-40dd-AFC4-6F175D3DCCD1}">
-              <a14:hiddenFill xmlns="" xmlns:a14="http://schemas.microsoft.com/office/drawing/2010/main">
+              <a14:hiddenFill xmlns:a14="http://schemas.microsoft.com/office/drawing/2010/main" xmlns="">
                 <a:solidFill>
                   <a:srgbClr val="FFFFFF"/>
                 </a:solidFill>
               </a14:hiddenFill>
             </a:ext>
             <a:ext uri="{91240B29-F687-4f45-9708-019B960494DF}">
-              <a14:hiddenLine xmlns="" xmlns:a14="http://schemas.microsoft.com/office/drawing/2010/main" w="9525">
+              <a14:hiddenLine xmlns:a14="http://schemas.microsoft.com/office/drawing/2010/main" xmlns="" w="9525">
                 <a:solidFill>
                   <a:srgbClr val="000000"/>
                 </a:solidFill>
@@ -13949,14 +13951,14 @@
           </a:ln>
           <a:extLst>
             <a:ext uri="{909E8E84-426E-40dd-AFC4-6F175D3DCCD1}">
-              <a14:hiddenFill xmlns="" xmlns:a14="http://schemas.microsoft.com/office/drawing/2010/main">
+              <a14:hiddenFill xmlns:a14="http://schemas.microsoft.com/office/drawing/2010/main" xmlns="">
                 <a:solidFill>
                   <a:srgbClr val="FFFFFF"/>
                 </a:solidFill>
               </a14:hiddenFill>
             </a:ext>
             <a:ext uri="{91240B29-F687-4f45-9708-019B960494DF}">
-              <a14:hiddenLine xmlns="" xmlns:a14="http://schemas.microsoft.com/office/drawing/2010/main" w="9525">
+              <a14:hiddenLine xmlns:a14="http://schemas.microsoft.com/office/drawing/2010/main" xmlns="" w="9525">
                 <a:solidFill>
                   <a:srgbClr val="000000"/>
                 </a:solidFill>
@@ -14012,7 +14014,7 @@
         <p:spPr>
           <a:xfrm>
             <a:off x="223023" y="1416205"/>
-            <a:ext cx="5386037" cy="4973443"/>
+            <a:ext cx="5341436" cy="4973443"/>
           </a:xfrm>
         </p:spPr>
         <p:txBody>
@@ -14022,7 +14024,7 @@
             <a:pPr algn="just"/>
             <a:r>
               <a:rPr lang="en-BE" sz="1600" dirty="0"/>
-              <a:t>The CCB platform has taken on 29 projects since Aug 2020</a:t>
+              <a:t>The CCB Bioinformatics Platform has taken on 30 projects since Aug 2020. Projects are primarily single cell and bulk RNAseq, but also for other many diverse types of data</a:t>
             </a:r>
           </a:p>
           <a:p>
@@ -14033,7 +14035,7 @@
             <a:pPr algn="just"/>
             <a:r>
               <a:rPr lang="en-BE" sz="1600" dirty="0"/>
-              <a:t>Projects are primarily Single Cell RNAseq analysis and bulk RNAseq, but also CRISPR-Cas screens, WES copy number, proteomic analyses of MS data, FACS, gene coexpression network analysis and bulk RNA cell deconvolution </a:t>
+              <a:t>These projects commonly involve building pipelines, benchmarking public data, differential expression and GSEA, or data annotation</a:t>
             </a:r>
           </a:p>
           <a:p>
@@ -14044,29 +14046,40 @@
             <a:pPr algn="just"/>
             <a:r>
               <a:rPr lang="en-BE" sz="1600" dirty="0"/>
-              <a:t>The nature of these projects are commonly infrastructural (i.e. pipelines), benchmarking data (TCGA/GEO), differential expression and GSEA, or data manipulation (annotation or other biostatistical tasks)</a:t>
-            </a:r>
+              <a:t>CCB Bioinformatics Platform statistics can be found at: </a:t>
+            </a:r>
+            <a:r>
+              <a:rPr lang="en-GB" sz="1600" dirty="0">
+                <a:hlinkClick r:id="rId2"/>
+              </a:rPr>
+              <a:t>https://github.com/ccb-vib/ccb_project_management</a:t>
+            </a:r>
+            <a:endParaRPr lang="en-GB" sz="1600" dirty="0"/>
+          </a:p>
+          <a:p>
+            <a:pPr marL="0" indent="0" algn="just">
+              <a:buNone/>
+            </a:pPr>
+            <a:endParaRPr lang="en-BE" sz="1600" dirty="0"/>
           </a:p>
           <a:p>
             <a:pPr algn="just"/>
+            <a:r>
+              <a:rPr lang="en-BE" sz="1600" dirty="0"/>
+              <a:t>CCB Bioinformatics Platform has used the VSC and DILA servers for computational projects and VSC to store files for ongoing projects but a better data storage solution is needed which is transparent</a:t>
+            </a:r>
+          </a:p>
+          <a:p>
+            <a:pPr marL="0" indent="0" algn="just">
+              <a:buNone/>
+            </a:pPr>
             <a:endParaRPr lang="en-BE" sz="1600" dirty="0"/>
           </a:p>
           <a:p>
             <a:pPr algn="just"/>
             <a:r>
-              <a:rPr lang="en-BE" sz="1600" dirty="0"/>
-              <a:t>L and K drives frequently used by labs for data storage. Data storage has become an issue for some labs and for  the CCB Bioinformatics Platform storing large files for ongoing projects (BAM and large Single Cell datasets, etc)</a:t>
-            </a:r>
-          </a:p>
-          <a:p>
-            <a:pPr algn="just"/>
-            <a:endParaRPr lang="en-BE" sz="1600" dirty="0"/>
-          </a:p>
-          <a:p>
-            <a:pPr algn="just"/>
-            <a:r>
               <a:rPr lang="en-BE" sz="1600" b="1" i="1" dirty="0"/>
-              <a:t>Action Item #1: a better data storage solution is needed to meet the needs of various labs and the platform</a:t>
+              <a:t>Action Item #1: A better data storage solution schema is needed to meet the needs of various labs and the platform</a:t>
             </a:r>
           </a:p>
         </p:txBody>
@@ -14101,40 +14114,10 @@
       </p:sp>
       <p:pic>
         <p:nvPicPr>
-          <p:cNvPr id="5" name="Picture 4">
+          <p:cNvPr id="7" name="Picture 6">
             <a:extLst>
               <a:ext uri="{FF2B5EF4-FFF2-40B4-BE49-F238E27FC236}">
-                <a16:creationId xmlns:a16="http://schemas.microsoft.com/office/drawing/2014/main" id="{03A0A6E2-CB96-7449-A277-E4AF48E816B5}"/>
-              </a:ext>
-            </a:extLst>
-          </p:cNvPr>
-          <p:cNvPicPr>
-            <a:picLocks noChangeAspect="1"/>
-          </p:cNvPicPr>
-          <p:nvPr/>
-        </p:nvPicPr>
-        <p:blipFill>
-          <a:blip r:embed="rId2"/>
-          <a:stretch>
-            <a:fillRect/>
-          </a:stretch>
-        </p:blipFill>
-        <p:spPr>
-          <a:xfrm>
-            <a:off x="5720577" y="4154005"/>
-            <a:ext cx="3267301" cy="2609456"/>
-          </a:xfrm>
-          <a:prstGeom prst="rect">
-            <a:avLst/>
-          </a:prstGeom>
-        </p:spPr>
-      </p:pic>
-      <p:pic>
-        <p:nvPicPr>
-          <p:cNvPr id="11" name="Picture 10">
-            <a:extLst>
-              <a:ext uri="{FF2B5EF4-FFF2-40B4-BE49-F238E27FC236}">
-                <a16:creationId xmlns:a16="http://schemas.microsoft.com/office/drawing/2014/main" id="{A7A86FA6-326D-8C4C-ABC2-FD1759DAFD7C}"/>
+                <a16:creationId xmlns:a16="http://schemas.microsoft.com/office/drawing/2014/main" id="{8158ADCD-928E-C44E-BD32-7AD49F0C354A}"/>
               </a:ext>
             </a:extLst>
           </p:cNvPr>
@@ -14151,8 +14134,38 @@
         </p:blipFill>
         <p:spPr>
           <a:xfrm>
-            <a:off x="5737620" y="1255966"/>
-            <a:ext cx="3384073" cy="2702717"/>
+            <a:off x="5538869" y="4145873"/>
+            <a:ext cx="3582446" cy="2411043"/>
+          </a:xfrm>
+          <a:prstGeom prst="rect">
+            <a:avLst/>
+          </a:prstGeom>
+        </p:spPr>
+      </p:pic>
+      <p:pic>
+        <p:nvPicPr>
+          <p:cNvPr id="14" name="Picture 13">
+            <a:extLst>
+              <a:ext uri="{FF2B5EF4-FFF2-40B4-BE49-F238E27FC236}">
+                <a16:creationId xmlns:a16="http://schemas.microsoft.com/office/drawing/2014/main" id="{0CAD8A7F-1431-4A47-AE5F-7BBC5BEB8481}"/>
+              </a:ext>
+            </a:extLst>
+          </p:cNvPr>
+          <p:cNvPicPr>
+            <a:picLocks noChangeAspect="1"/>
+          </p:cNvPicPr>
+          <p:nvPr/>
+        </p:nvPicPr>
+        <p:blipFill>
+          <a:blip r:embed="rId4"/>
+          <a:stretch>
+            <a:fillRect/>
+          </a:stretch>
+        </p:blipFill>
+        <p:spPr>
+          <a:xfrm>
+            <a:off x="5564459" y="1315839"/>
+            <a:ext cx="3556857" cy="2526143"/>
           </a:xfrm>
           <a:prstGeom prst="rect">
             <a:avLst/>
@@ -14208,7 +14221,7 @@
         <p:spPr>
           <a:xfrm>
             <a:off x="234179" y="1416206"/>
-            <a:ext cx="5220774" cy="5029200"/>
+            <a:ext cx="5009161" cy="5029200"/>
           </a:xfrm>
         </p:spPr>
         <p:txBody>
@@ -14217,56 +14230,56 @@
           <a:p>
             <a:pPr algn="just"/>
             <a:r>
-              <a:rPr lang="en-BE" sz="1500" dirty="0"/>
-              <a:t>Many labs have requested CCB Bioinformatics Platform services more than others. Assuming that all labs get an equal share of CCB project time, this equals 180 hrs per lab per year</a:t>
+              <a:rPr lang="en-BE" sz="1400" dirty="0"/>
+              <a:t>Many labs have requested Platform services more than others. If all labs get an equal share of Platform time, this equals ~180 hrs per lab per year</a:t>
             </a:r>
           </a:p>
           <a:p>
             <a:pPr marL="0" indent="0" algn="just">
               <a:buNone/>
             </a:pPr>
-            <a:endParaRPr lang="en-BE" sz="1500" dirty="0"/>
+            <a:endParaRPr lang="en-BE" sz="1400" dirty="0"/>
           </a:p>
           <a:p>
             <a:pPr algn="just"/>
             <a:r>
-              <a:rPr lang="en-BE" sz="1500" dirty="0"/>
-              <a:t>Sufficient weekly project requests are received such that working +55hrs a week is not enough to prevent growth of project backlog. This isn’t sustainable in the long term. Invoicing groups based on hours worked may be necessary…</a:t>
+              <a:rPr lang="en-BE" sz="1400" dirty="0"/>
+              <a:t>Sufficient weekly project requests are received such that working +55hrs a week is not enough to prevent growth of a substantial project backlog. This isn’t sustainable in the long term. Invoicing groups based on hours worked may be necessary…</a:t>
             </a:r>
           </a:p>
           <a:p>
             <a:pPr algn="just"/>
-            <a:endParaRPr lang="en-BE" sz="1500" dirty="0"/>
+            <a:endParaRPr lang="en-BE" sz="1400" dirty="0"/>
           </a:p>
           <a:p>
             <a:pPr algn="just"/>
             <a:r>
-              <a:rPr lang="en-BE" sz="1500" dirty="0"/>
+              <a:rPr lang="en-BE" sz="1400" dirty="0"/>
               <a:t>Splitting time equally among all open projects and labs means that project development is very slow</a:t>
             </a:r>
           </a:p>
           <a:p>
             <a:pPr algn="just"/>
-            <a:endParaRPr lang="en-BE" sz="1500" dirty="0"/>
+            <a:endParaRPr lang="en-BE" sz="1400" dirty="0"/>
           </a:p>
           <a:p>
             <a:pPr algn="just"/>
             <a:r>
-              <a:rPr lang="en-BE" sz="1500" dirty="0"/>
-              <a:t>It is very difficult to meet demand for rush projects requested on short notice (&lt; 1 week) with while there is a project backlog in addition to building and maintaining reliable infrastructure (e.g. new pipelines and services)</a:t>
+              <a:rPr lang="en-BE" sz="1400" dirty="0"/>
+              <a:t>It is difficult to meet demand for rush projects requested on short notice (&lt; 1 week) while there is backlog of projcts in addition to building and maintaining reliable infrastructure (e.g. new pipelines and services)</a:t>
             </a:r>
           </a:p>
           <a:p>
             <a:pPr algn="just"/>
-            <a:endParaRPr lang="en-BE" sz="1500" dirty="0"/>
+            <a:endParaRPr lang="en-BE" sz="1400" dirty="0"/>
           </a:p>
           <a:p>
             <a:pPr algn="just"/>
             <a:r>
-              <a:rPr lang="en-BE" sz="1500" b="1" i="1" dirty="0"/>
-              <a:t>Action Item #2: strive towards a more equitable distribution of  CCB Bioinformatics Platform resources</a:t>
-            </a:r>
-            <a:endParaRPr lang="en-BE" sz="1500" dirty="0"/>
+              <a:rPr lang="en-BE" sz="1400" b="1" i="1" dirty="0"/>
+              <a:t>Action Item #2: Strive towards an equitable distribution of usage of CCB Bioinformatics Platform resources and develop scheduled time to develop new services </a:t>
+            </a:r>
+            <a:endParaRPr lang="en-BE" sz="1400" dirty="0"/>
           </a:p>
         </p:txBody>
       </p:sp>
@@ -14300,10 +14313,10 @@
       </p:sp>
       <p:pic>
         <p:nvPicPr>
-          <p:cNvPr id="6" name="Picture 5">
+          <p:cNvPr id="8" name="Picture 7">
             <a:extLst>
               <a:ext uri="{FF2B5EF4-FFF2-40B4-BE49-F238E27FC236}">
-                <a16:creationId xmlns:a16="http://schemas.microsoft.com/office/drawing/2014/main" id="{A4F036A8-9FEC-5343-AEE6-118634CFB1CF}"/>
+                <a16:creationId xmlns:a16="http://schemas.microsoft.com/office/drawing/2014/main" id="{8B834CAC-3B20-0A41-889B-5F4BF09216B1}"/>
               </a:ext>
             </a:extLst>
           </p:cNvPr>
@@ -14320,8 +14333,8 @@
         </p:blipFill>
         <p:spPr>
           <a:xfrm>
-            <a:off x="5689128" y="4029637"/>
-            <a:ext cx="3454871" cy="2759259"/>
+            <a:off x="5466104" y="4175464"/>
+            <a:ext cx="3662807" cy="2465127"/>
           </a:xfrm>
           <a:prstGeom prst="rect">
             <a:avLst/>
@@ -14330,10 +14343,10 @@
       </p:pic>
       <p:pic>
         <p:nvPicPr>
-          <p:cNvPr id="7" name="Picture 6">
+          <p:cNvPr id="9" name="Picture 8">
             <a:extLst>
               <a:ext uri="{FF2B5EF4-FFF2-40B4-BE49-F238E27FC236}">
-                <a16:creationId xmlns:a16="http://schemas.microsoft.com/office/drawing/2014/main" id="{7E9AE61C-4EC4-8B46-8E27-371F9D274718}"/>
+                <a16:creationId xmlns:a16="http://schemas.microsoft.com/office/drawing/2014/main" id="{76173F8F-86E4-E54A-809D-746BFA28FA77}"/>
               </a:ext>
             </a:extLst>
           </p:cNvPr>
@@ -14350,8 +14363,8 @@
         </p:blipFill>
         <p:spPr>
           <a:xfrm>
-            <a:off x="5454953" y="1263544"/>
-            <a:ext cx="3454869" cy="2759258"/>
+            <a:off x="5243340" y="1286487"/>
+            <a:ext cx="3900660" cy="2625206"/>
           </a:xfrm>
           <a:prstGeom prst="rect">
             <a:avLst/>
@@ -14407,7 +14420,7 @@
         <p:spPr>
           <a:xfrm>
             <a:off x="457199" y="1438508"/>
-            <a:ext cx="8474928" cy="4687656"/>
+            <a:ext cx="8564138" cy="4687656"/>
           </a:xfrm>
         </p:spPr>
         <p:txBody>
@@ -14415,116 +14428,93 @@
           <a:lstStyle/>
           <a:p>
             <a:r>
-              <a:rPr lang="en-BE" sz="1400" dirty="0"/>
-              <a:t>The CCB Bioinformatics Platform receives many requests which are difficult to fulfill for various reasons:</a:t>
-            </a:r>
-          </a:p>
-          <a:p>
-            <a:endParaRPr lang="en-BE" sz="1400" dirty="0"/>
-          </a:p>
-          <a:p>
-            <a:r>
-              <a:rPr lang="en-BE" sz="1400" b="1" i="1" dirty="0"/>
+              <a:rPr lang="en-BE" sz="1500" b="1" i="1" dirty="0"/>
               <a:t>“We have a grant deadline in less than a week, can you perform cell </a:t>
             </a:r>
             <a:r>
-              <a:rPr lang="en-GB" sz="1400" b="1" i="1" dirty="0"/>
+              <a:rPr lang="en-GB" sz="1500" b="1" i="1" dirty="0"/>
               <a:t>deconvolution on bulk </a:t>
             </a:r>
             <a:r>
-              <a:rPr lang="en-GB" sz="1400" b="1" i="1" dirty="0" err="1"/>
+              <a:rPr lang="en-GB" sz="1500" b="1" i="1" dirty="0" err="1"/>
               <a:t>RNAseq</a:t>
             </a:r>
             <a:r>
-              <a:rPr lang="en-GB" sz="1400" b="1" i="1" dirty="0"/>
+              <a:rPr lang="en-GB" sz="1500" b="1" i="1" dirty="0"/>
               <a:t> data on it?”</a:t>
             </a:r>
             <a:r>
-              <a:rPr lang="en-GB" sz="1400" dirty="0"/>
-              <a:t> We can usually squeeze in a rush project and deliver results if the project will take only a few hours but we typically can’t perform an analysis using a new technique/package that quickly </a:t>
-            </a:r>
-          </a:p>
-          <a:p>
-            <a:endParaRPr lang="en-GB" sz="1400" dirty="0"/>
-          </a:p>
-          <a:p>
-            <a:r>
-              <a:rPr lang="en-BE" sz="1400" b="1" i="1" dirty="0"/>
-              <a:t>“Can you locate and download the right dataset for our research? (usually asked without defining the research question)” </a:t>
-            </a:r>
-            <a:r>
-              <a:rPr lang="en-BE" sz="1400" dirty="0"/>
+              <a:rPr lang="en-GB" sz="1500" dirty="0"/>
+              <a:t> It is usually possible squeeze in a rush project and deliver results if the project will take only a few hours but it is typically not possible to perform an analysis using a new tool quickly </a:t>
+            </a:r>
+          </a:p>
+          <a:p>
+            <a:endParaRPr lang="en-GB" sz="1500" dirty="0"/>
+          </a:p>
+          <a:p>
+            <a:r>
+              <a:rPr lang="en-BE" sz="1500" b="1" i="1" dirty="0"/>
+              <a:t>“Do you know of a good dataset for our research? (usually asked without sufficiently defining the research question)” </a:t>
+            </a:r>
+            <a:r>
+              <a:rPr lang="en-BE" sz="1500" dirty="0"/>
               <a:t> We are happy to guide people to appropriate databases and help them access data to meet their research needs but in the interests of time spent, it’s best for biologists to bring data to the platform</a:t>
             </a:r>
-            <a:endParaRPr lang="en-GB" sz="1400" dirty="0"/>
-          </a:p>
-          <a:p>
-            <a:endParaRPr lang="en-GB" sz="1400" dirty="0"/>
-          </a:p>
-          <a:p>
-            <a:r>
-              <a:rPr lang="en-GB" sz="1400" b="1" i="1" dirty="0"/>
+            <a:endParaRPr lang="en-GB" sz="1500" dirty="0"/>
+          </a:p>
+          <a:p>
+            <a:endParaRPr lang="en-GB" sz="1500" dirty="0"/>
+          </a:p>
+          <a:p>
+            <a:r>
+              <a:rPr lang="en-GB" sz="1500" b="1" i="1" dirty="0"/>
               <a:t>“Can you look at the data from the Korean paper?”</a:t>
             </a:r>
             <a:r>
-              <a:rPr lang="en-GB" sz="1400" b="1" dirty="0"/>
+              <a:rPr lang="en-GB" sz="1500" b="1" dirty="0"/>
               <a:t> </a:t>
             </a:r>
             <a:r>
-              <a:rPr lang="en-GB" sz="1400" dirty="0"/>
+              <a:rPr lang="en-GB" sz="1500" dirty="0"/>
               <a:t>When referring to datasets, please be exact and provide the GSE accession number, file name and/or path and also be specific about what your hypothesis is when </a:t>
             </a:r>
             <a:r>
-              <a:rPr lang="en-GB" sz="1400" dirty="0" err="1"/>
+              <a:rPr lang="en-GB" sz="1500" dirty="0" err="1"/>
               <a:t>analyzing</a:t>
             </a:r>
             <a:r>
-              <a:rPr lang="en-GB" sz="1400" dirty="0"/>
+              <a:rPr lang="en-GB" sz="1500" dirty="0"/>
               <a:t> the data. It may be necessary to implement a request form to reduce misunderstandings</a:t>
             </a:r>
           </a:p>
           <a:p>
-            <a:endParaRPr lang="en-GB" sz="1400" dirty="0"/>
-          </a:p>
-          <a:p>
-            <a:r>
-              <a:rPr lang="en-GB" sz="1400" b="1" i="1" dirty="0"/>
-              <a:t>“Isn’t there some ‘statistical’ thing that you can do to look at the expression of my gene of interest in this specific cell type in my bulk </a:t>
-            </a:r>
-            <a:r>
-              <a:rPr lang="en-GB" sz="1400" b="1" i="1" dirty="0" err="1"/>
-              <a:t>RNAseq</a:t>
-            </a:r>
-            <a:r>
-              <a:rPr lang="en-GB" sz="1400" b="1" i="1" dirty="0"/>
-              <a:t> dataset?” </a:t>
-            </a:r>
-            <a:r>
-              <a:rPr lang="en-GB" sz="1400" dirty="0"/>
-              <a:t>We would like to implement more advanced bioinformatic techniques such as cell deconvolution pipelines and </a:t>
-            </a:r>
-            <a:r>
-              <a:rPr lang="en-BE" sz="1400" dirty="0"/>
-              <a:t>gene coexpression network analysis</a:t>
-            </a:r>
-            <a:r>
-              <a:rPr lang="en-GB" sz="1400" dirty="0"/>
-              <a:t> but the amount of project requests prevents much time being spent to develop this infrastructure</a:t>
-            </a:r>
-          </a:p>
-          <a:p>
-            <a:endParaRPr lang="en-GB" sz="1400" dirty="0"/>
-          </a:p>
-          <a:p>
-            <a:r>
-              <a:rPr lang="en-GB" sz="1400" b="1" i="1" dirty="0"/>
+            <a:pPr marL="0" indent="0">
+              <a:buNone/>
+            </a:pPr>
+            <a:endParaRPr lang="en-GB" sz="1500" dirty="0"/>
+          </a:p>
+          <a:p>
+            <a:r>
+              <a:rPr lang="en-GB" sz="1500" b="1" i="1" dirty="0"/>
               <a:t>“Can you move these files for me?” </a:t>
             </a:r>
             <a:r>
-              <a:rPr lang="en-GB" sz="1400" dirty="0"/>
-              <a:t>Nothing wrong with asking this now and again, but every lab should ideally have at least one individual familiar with bash/command line so that this can be done in-house</a:t>
-            </a:r>
-            <a:endParaRPr lang="en-BE" sz="1400" dirty="0"/>
+              <a:rPr lang="en-GB" sz="1500" dirty="0"/>
+              <a:t>Nothing wrong with asking this now and again, but every lab should ideally have at least one individual familiar with the command line so that this can be done in-house</a:t>
+            </a:r>
+          </a:p>
+          <a:p>
+            <a:endParaRPr lang="en-GB" sz="1500" dirty="0"/>
+          </a:p>
+          <a:p>
+            <a:r>
+              <a:rPr lang="en-BE" sz="1500" b="1" i="1" dirty="0"/>
+              <a:t>Action Item #3: A more formal system of CCB Bioinformatics Platform requests may be necessary. There is no real disincentive for CCB labs to outsource every computational task (no matter how trivial) to the CCB bioinformatics platform</a:t>
+            </a:r>
+            <a:endParaRPr lang="en-BE" sz="1500" dirty="0"/>
+          </a:p>
+          <a:p>
+            <a:endParaRPr lang="en-BE" sz="1500" dirty="0"/>
           </a:p>
         </p:txBody>
       </p:sp>
@@ -14604,8 +14594,8 @@
         </p:nvSpPr>
         <p:spPr>
           <a:xfrm>
-            <a:off x="457200" y="1600200"/>
-            <a:ext cx="8251902" cy="4525963"/>
+            <a:off x="457200" y="1471962"/>
+            <a:ext cx="8251902" cy="4654202"/>
           </a:xfrm>
         </p:spPr>
         <p:txBody>
@@ -14614,7 +14604,7 @@
           <a:p>
             <a:r>
               <a:rPr lang="en-BE" sz="1400" dirty="0"/>
-              <a:t>The CCB Bioinformatics Platform intends to develop and maintain pipelines and bioinformatic report templates to be made available for general use (i.e. bulk RNAseq, CRISPR screens, SNP calling, WES CN, etc)</a:t>
+              <a:t>The CCB Bioinformatics Platform intends to develop and maintain pipelines and bioinformatic report templates that are made available for general use (i.e. bulk RNAseq, CRISPR-Cas9 screens, SNP calling, WES copy number, bulk cell deconvolution and gene co-expression, etc)</a:t>
             </a:r>
           </a:p>
           <a:p>
@@ -14623,25 +14613,17 @@
           <a:p>
             <a:r>
               <a:rPr lang="en-BE" sz="1400" dirty="0"/>
-              <a:t>However, it is an open question where these pipelines and infrastructure should be stored and housed (bioinformatic report templates can be stored on GitHub)</a:t>
-            </a:r>
-          </a:p>
-          <a:p>
-            <a:endParaRPr lang="en-BE" sz="1400" dirty="0"/>
-          </a:p>
-          <a:p>
-            <a:r>
-              <a:rPr lang="en-BE" sz="1400" dirty="0"/>
-              <a:t>The VSC can sometimes be unreliable due to shortages in computational resources or encountering cryptic errors</a:t>
-            </a:r>
-          </a:p>
-          <a:p>
-            <a:endParaRPr lang="en-BE" sz="1400" dirty="0"/>
-          </a:p>
-          <a:p>
-            <a:r>
-              <a:rPr lang="en-BE" sz="1400" dirty="0"/>
-              <a:t>Some CCB groups are encountering storage issues, however there may be different computational requirements for storing image data vs count data</a:t>
+              <a:t>However, it is an open question where these pipelines and data should be stored (VSC or some other solution). Bioinformatic report templates are currently stored on GitHub (</a:t>
+            </a:r>
+            <a:r>
+              <a:rPr lang="en-GB" sz="1400" dirty="0">
+                <a:hlinkClick r:id="rId2"/>
+              </a:rPr>
+              <a:t>https://github.com/ccb-vib</a:t>
+            </a:r>
+            <a:r>
+              <a:rPr lang="en-GB" sz="1400" dirty="0"/>
+              <a:t>)</a:t>
             </a:r>
           </a:p>
           <a:p>
@@ -14653,7 +14635,7 @@
           <a:p>
             <a:r>
               <a:rPr lang="en-BE" sz="1400" dirty="0"/>
-              <a:t>Urbain Scherpereel and Rinaldo Beck have offered to help in developing a data storage solution but need input from you (the CCB Group Leaders). The caveat is that CCB groups may have less “local” control over compuptational resources if this solution is chosen</a:t>
+              <a:t>The VSC is used for larger tasks, but can sometimes be unreliable due to shortages in computational resources or encountering cryptic errors. CCB Platform has used DILA servers for some analyses but this is not a long term solution</a:t>
             </a:r>
           </a:p>
           <a:p>
@@ -14661,12 +14643,34 @@
           </a:p>
           <a:p>
             <a:r>
+              <a:rPr lang="en-BE" sz="1400" dirty="0"/>
+              <a:t>The VSC is not ideal for setting up pipelines for general CCB use due to steep learning curve and need for interactive sessions</a:t>
+            </a:r>
+          </a:p>
+          <a:p>
+            <a:endParaRPr lang="en-BE" sz="1400" dirty="0"/>
+          </a:p>
+          <a:p>
+            <a:r>
+              <a:rPr lang="en-BE" sz="1400" dirty="0"/>
+              <a:t>Additionally, some CCB groups have encountered storage issues, using L and K drives, especially labs working with image data </a:t>
+            </a:r>
+          </a:p>
+          <a:p>
+            <a:endParaRPr lang="en-BE" sz="1400" dirty="0"/>
+          </a:p>
+          <a:p>
+            <a:r>
               <a:rPr lang="en-BE" sz="1400" b="1" i="1" dirty="0"/>
-              <a:t>Action Item #3</a:t>
+              <a:t>Action Item #4</a:t>
             </a:r>
             <a:r>
               <a:rPr lang="en-BE" sz="1400" dirty="0"/>
-              <a:t>: A dedicated CCB Bioinformatics Platform node would be an ideal place for research data and communal infrastructure to be housed. This node should meet the needs of as many groups at CCB as possible. A strategy from the Group Leaders needs to be discussed and outlined address this</a:t>
+              <a:t>: </a:t>
+            </a:r>
+            <a:r>
+              <a:rPr lang="en-BE" sz="1400" b="1" i="1" dirty="0"/>
+              <a:t>A dedicated CCB Bioinformatics Platform node would be an ideal place for research data and communal bioinformatic infrastructure to be housed. A strategy from needs to be discussed and outlined to address how this node will meet the needs of CCB groups</a:t>
             </a:r>
           </a:p>
         </p:txBody>
@@ -14747,8 +14751,8 @@
         </p:nvSpPr>
         <p:spPr>
           <a:xfrm>
-            <a:off x="457200" y="1600200"/>
-            <a:ext cx="8251902" cy="4525963"/>
+            <a:off x="457199" y="1600200"/>
+            <a:ext cx="8385717" cy="953615"/>
           </a:xfrm>
         </p:spPr>
         <p:txBody>
@@ -14756,44 +14760,8 @@
           <a:lstStyle/>
           <a:p>
             <a:r>
-              <a:rPr lang="en-BE" sz="1400" dirty="0"/>
-              <a:t>The CCB Bioinformatics Platform will implement a project management system (OpenProject) displaying forecasts of project hours, providing a transparent format to communicate a timeline outline when stakeholders can reasonably expect results</a:t>
-            </a:r>
-          </a:p>
-          <a:p>
-            <a:endParaRPr lang="en-BE" sz="1400" dirty="0"/>
-          </a:p>
-          <a:p>
-            <a:r>
-              <a:rPr lang="en-BE" sz="1400" dirty="0"/>
-              <a:t>In the interest of fairness to the commitments to other labs, newly requested projects from a given lab will typically be addressed after current projects from that same lab have been completed. Please inform the platform of upcoming deadlines far in advance whenever possible</a:t>
-            </a:r>
-          </a:p>
-          <a:p>
-            <a:endParaRPr lang="en-BE" sz="1400" dirty="0"/>
-          </a:p>
-          <a:p>
-            <a:r>
-              <a:rPr lang="en-BE" sz="1400" dirty="0"/>
-              <a:t>In order to make the best use of bioinformatic infrastructure made available by the CCB Platform, we strongly encourage lab members such as PhD students to enroll in bioinformatic courses and symposia to become familiar with R/Python, bash and Bioconductor to become more proficient at using bioinformatic tools</a:t>
-            </a:r>
-          </a:p>
-          <a:p>
-            <a:endParaRPr lang="en-BE" sz="1400" dirty="0"/>
-          </a:p>
-          <a:p>
-            <a:r>
-              <a:rPr lang="en-BE" sz="1400" dirty="0"/>
-              <a:t>In the interest of time efficiency, it is preferred for data to be presented to the CCB platform rather than requesting the CCB platform to search for the desired data (i.e. please send url links, GSE accession numbers or directory paths to data whenever possible)</a:t>
-            </a:r>
-          </a:p>
-          <a:p>
-            <a:endParaRPr lang="en-BE" sz="1400" dirty="0"/>
-          </a:p>
-          <a:p>
-            <a:r>
-              <a:rPr lang="en-BE" sz="1400" dirty="0"/>
-              <a:t>Lastly, if you use work from the CCB Bioinformatics Platform in a publication, please cite the author!</a:t>
+              <a:rPr lang="en-BE" sz="1600" dirty="0"/>
+              <a:t>Urbain Scherpereel and Rinaldo Beck have offered to help in developing a data storage and computational solution but require input from the CCB Group Leaders</a:t>
             </a:r>
           </a:p>
         </p:txBody>
@@ -14821,7 +14789,486 @@
           <a:p>
             <a:r>
               <a:rPr lang="en-BE" dirty="0"/>
-              <a:t>Other Potential Solutions</a:t>
+              <a:t>CCB Node Architecture Pros and Cons</a:t>
+            </a:r>
+          </a:p>
+        </p:txBody>
+      </p:sp>
+      <p:sp>
+        <p:nvSpPr>
+          <p:cNvPr id="4" name="TextBox 3">
+            <a:extLst>
+              <a:ext uri="{FF2B5EF4-FFF2-40B4-BE49-F238E27FC236}">
+                <a16:creationId xmlns:a16="http://schemas.microsoft.com/office/drawing/2014/main" id="{50285EE7-D9CF-3544-8425-180D75AB8DA7}"/>
+              </a:ext>
+            </a:extLst>
+          </p:cNvPr>
+          <p:cNvSpPr txBox="1"/>
+          <p:nvPr/>
+        </p:nvSpPr>
+        <p:spPr>
+          <a:xfrm>
+            <a:off x="457199" y="3033134"/>
+            <a:ext cx="4114801" cy="3416320"/>
+          </a:xfrm>
+          <a:prstGeom prst="rect">
+            <a:avLst/>
+          </a:prstGeom>
+          <a:noFill/>
+        </p:spPr>
+        <p:txBody>
+          <a:bodyPr wrap="square" rtlCol="0">
+            <a:spAutoFit/>
+          </a:bodyPr>
+          <a:lstStyle/>
+          <a:p>
+            <a:pPr marL="285750" indent="-285750">
+              <a:buFont typeface="Arial" panose="020B0604020202020204" pitchFamily="34" charset="0"/>
+              <a:buChar char="•"/>
+            </a:pPr>
+            <a:r>
+              <a:rPr lang="en-BE" dirty="0"/>
+              <a:t>Similar to DILA Server #6</a:t>
+            </a:r>
+          </a:p>
+          <a:p>
+            <a:pPr marL="285750" indent="-285750">
+              <a:buFont typeface="Arial" panose="020B0604020202020204" pitchFamily="34" charset="0"/>
+              <a:buChar char="•"/>
+            </a:pPr>
+            <a:r>
+              <a:rPr lang="en-BE" dirty="0"/>
+              <a:t>Price is ~65K euros</a:t>
+            </a:r>
+          </a:p>
+          <a:p>
+            <a:pPr marL="285750" indent="-285750">
+              <a:buFont typeface="Arial" panose="020B0604020202020204" pitchFamily="34" charset="0"/>
+              <a:buChar char="•"/>
+            </a:pPr>
+            <a:r>
+              <a:rPr lang="en-BE" dirty="0"/>
+              <a:t>CCB must maintain server (no help from ICTS)</a:t>
+            </a:r>
+          </a:p>
+          <a:p>
+            <a:pPr marL="285750" indent="-285750">
+              <a:buFont typeface="Arial" panose="020B0604020202020204" pitchFamily="34" charset="0"/>
+              <a:buChar char="•"/>
+            </a:pPr>
+            <a:r>
+              <a:rPr lang="en-BE" dirty="0"/>
+              <a:t>Limited cores available</a:t>
+            </a:r>
+          </a:p>
+          <a:p>
+            <a:pPr marL="285750" indent="-285750">
+              <a:buFont typeface="Arial" panose="020B0604020202020204" pitchFamily="34" charset="0"/>
+              <a:buChar char="•"/>
+            </a:pPr>
+            <a:r>
+              <a:rPr lang="en-BE" dirty="0"/>
+              <a:t>Easy supports interactive sessions</a:t>
+            </a:r>
+          </a:p>
+          <a:p>
+            <a:pPr marL="285750" indent="-285750">
+              <a:buFont typeface="Arial" panose="020B0604020202020204" pitchFamily="34" charset="0"/>
+              <a:buChar char="•"/>
+            </a:pPr>
+            <a:r>
+              <a:rPr lang="en-BE" dirty="0"/>
+              <a:t>More “local” control over resources</a:t>
+            </a:r>
+          </a:p>
+          <a:p>
+            <a:pPr marL="285750" indent="-285750">
+              <a:buFont typeface="Arial" panose="020B0604020202020204" pitchFamily="34" charset="0"/>
+              <a:buChar char="•"/>
+            </a:pPr>
+            <a:r>
+              <a:rPr lang="en-BE" dirty="0"/>
+              <a:t>Ongoing cost is may be less than cloud solution</a:t>
+            </a:r>
+          </a:p>
+          <a:p>
+            <a:pPr marL="285750" indent="-285750">
+              <a:buFont typeface="Arial" panose="020B0604020202020204" pitchFamily="34" charset="0"/>
+              <a:buChar char="•"/>
+            </a:pPr>
+            <a:endParaRPr lang="en-BE" dirty="0"/>
+          </a:p>
+          <a:p>
+            <a:endParaRPr lang="en-BE" b="1" dirty="0"/>
+          </a:p>
+          <a:p>
+            <a:endParaRPr lang="en-BE" dirty="0"/>
+          </a:p>
+        </p:txBody>
+      </p:sp>
+      <p:sp>
+        <p:nvSpPr>
+          <p:cNvPr id="5" name="TextBox 4">
+            <a:extLst>
+              <a:ext uri="{FF2B5EF4-FFF2-40B4-BE49-F238E27FC236}">
+                <a16:creationId xmlns:a16="http://schemas.microsoft.com/office/drawing/2014/main" id="{B233D0F4-CE18-1A4B-B0DC-41246CA8DE12}"/>
+              </a:ext>
+            </a:extLst>
+          </p:cNvPr>
+          <p:cNvSpPr txBox="1"/>
+          <p:nvPr/>
+        </p:nvSpPr>
+        <p:spPr>
+          <a:xfrm>
+            <a:off x="4579434" y="2999679"/>
+            <a:ext cx="4114801" cy="3416320"/>
+          </a:xfrm>
+          <a:prstGeom prst="rect">
+            <a:avLst/>
+          </a:prstGeom>
+          <a:noFill/>
+        </p:spPr>
+        <p:txBody>
+          <a:bodyPr wrap="square" rtlCol="0">
+            <a:spAutoFit/>
+          </a:bodyPr>
+          <a:lstStyle/>
+          <a:p>
+            <a:pPr marL="285750" indent="-285750">
+              <a:buFont typeface="Arial" panose="020B0604020202020204" pitchFamily="34" charset="0"/>
+              <a:buChar char="•"/>
+            </a:pPr>
+            <a:r>
+              <a:rPr lang="en-BE" dirty="0"/>
+              <a:t>Scalable (hundreds of cores available per user)</a:t>
+            </a:r>
+          </a:p>
+          <a:p>
+            <a:pPr marL="285750" indent="-285750">
+              <a:buFont typeface="Arial" panose="020B0604020202020204" pitchFamily="34" charset="0"/>
+              <a:buChar char="•"/>
+            </a:pPr>
+            <a:r>
+              <a:rPr lang="en-BE" dirty="0"/>
+              <a:t>Low latency 99.5% uptime</a:t>
+            </a:r>
+          </a:p>
+          <a:p>
+            <a:pPr marL="285750" indent="-285750">
+              <a:buFont typeface="Arial" panose="020B0604020202020204" pitchFamily="34" charset="0"/>
+              <a:buChar char="•"/>
+            </a:pPr>
+            <a:r>
+              <a:rPr lang="en-BE" dirty="0"/>
+              <a:t>Azure maintains servers + backups, VIB headquarters will offer guidance</a:t>
+            </a:r>
+          </a:p>
+          <a:p>
+            <a:pPr marL="285750" indent="-285750">
+              <a:buFont typeface="Arial" panose="020B0604020202020204" pitchFamily="34" charset="0"/>
+              <a:buChar char="•"/>
+            </a:pPr>
+            <a:r>
+              <a:rPr lang="en-BE" dirty="0"/>
+              <a:t>Must pay for all storage and computation (</a:t>
+            </a:r>
+            <a:r>
+              <a:rPr lang="en-BE" dirty="0">
+                <a:hlinkClick r:id="rId2"/>
+              </a:rPr>
+              <a:t>ongoing costs</a:t>
+            </a:r>
+            <a:r>
+              <a:rPr lang="en-BE" dirty="0"/>
+              <a:t>)</a:t>
+            </a:r>
+          </a:p>
+          <a:p>
+            <a:pPr marL="285750" indent="-285750">
+              <a:buFont typeface="Arial" panose="020B0604020202020204" pitchFamily="34" charset="0"/>
+              <a:buChar char="•"/>
+            </a:pPr>
+            <a:r>
+              <a:rPr lang="en-BE" dirty="0"/>
+              <a:t>If you leave a process running = €€€!</a:t>
+            </a:r>
+          </a:p>
+          <a:p>
+            <a:pPr marL="285750" indent="-285750">
+              <a:buFont typeface="Arial" panose="020B0604020202020204" pitchFamily="34" charset="0"/>
+              <a:buChar char="•"/>
+            </a:pPr>
+            <a:r>
+              <a:rPr lang="en-BE" dirty="0"/>
+              <a:t>Each lab uses and pays for containers</a:t>
+            </a:r>
+          </a:p>
+          <a:p>
+            <a:pPr marL="285750" indent="-285750">
+              <a:buFont typeface="Arial" panose="020B0604020202020204" pitchFamily="34" charset="0"/>
+              <a:buChar char="•"/>
+            </a:pPr>
+            <a:endParaRPr lang="en-BE" dirty="0"/>
+          </a:p>
+          <a:p>
+            <a:endParaRPr lang="en-BE" b="1" dirty="0"/>
+          </a:p>
+          <a:p>
+            <a:endParaRPr lang="en-BE" dirty="0"/>
+          </a:p>
+        </p:txBody>
+      </p:sp>
+      <p:sp>
+        <p:nvSpPr>
+          <p:cNvPr id="6" name="TextBox 5">
+            <a:extLst>
+              <a:ext uri="{FF2B5EF4-FFF2-40B4-BE49-F238E27FC236}">
+                <a16:creationId xmlns:a16="http://schemas.microsoft.com/office/drawing/2014/main" id="{B2D01C91-E6C2-DE4C-BE2A-08E26E4804AB}"/>
+              </a:ext>
+            </a:extLst>
+          </p:cNvPr>
+          <p:cNvSpPr txBox="1"/>
+          <p:nvPr/>
+        </p:nvSpPr>
+        <p:spPr>
+          <a:xfrm>
+            <a:off x="1449095" y="2328685"/>
+            <a:ext cx="1773178" cy="369332"/>
+          </a:xfrm>
+          <a:prstGeom prst="rect">
+            <a:avLst/>
+          </a:prstGeom>
+          <a:noFill/>
+        </p:spPr>
+        <p:txBody>
+          <a:bodyPr wrap="none" rtlCol="0">
+            <a:spAutoFit/>
+          </a:bodyPr>
+          <a:lstStyle/>
+          <a:p>
+            <a:r>
+              <a:rPr lang="en-BE" b="1" dirty="0"/>
+              <a:t>R65 Linux Server</a:t>
+            </a:r>
+          </a:p>
+        </p:txBody>
+      </p:sp>
+      <p:sp>
+        <p:nvSpPr>
+          <p:cNvPr id="7" name="TextBox 6">
+            <a:extLst>
+              <a:ext uri="{FF2B5EF4-FFF2-40B4-BE49-F238E27FC236}">
+                <a16:creationId xmlns:a16="http://schemas.microsoft.com/office/drawing/2014/main" id="{67D57784-E031-ED4B-815A-063E5668FCF5}"/>
+              </a:ext>
+            </a:extLst>
+          </p:cNvPr>
+          <p:cNvSpPr txBox="1"/>
+          <p:nvPr/>
+        </p:nvSpPr>
+        <p:spPr>
+          <a:xfrm>
+            <a:off x="5174165" y="2317534"/>
+            <a:ext cx="3520069" cy="369332"/>
+          </a:xfrm>
+          <a:prstGeom prst="rect">
+            <a:avLst/>
+          </a:prstGeom>
+          <a:noFill/>
+        </p:spPr>
+        <p:txBody>
+          <a:bodyPr wrap="square" rtlCol="0">
+            <a:spAutoFit/>
+          </a:bodyPr>
+          <a:lstStyle/>
+          <a:p>
+            <a:r>
+              <a:rPr lang="en-BE" b="1" dirty="0"/>
+              <a:t>Microsoft Azure Cloud Solution</a:t>
+            </a:r>
+          </a:p>
+        </p:txBody>
+      </p:sp>
+      <p:sp>
+        <p:nvSpPr>
+          <p:cNvPr id="8" name="TextBox 7">
+            <a:extLst>
+              <a:ext uri="{FF2B5EF4-FFF2-40B4-BE49-F238E27FC236}">
+                <a16:creationId xmlns:a16="http://schemas.microsoft.com/office/drawing/2014/main" id="{E38F279C-2A26-6748-980C-B5C2A0BE46B9}"/>
+              </a:ext>
+            </a:extLst>
+          </p:cNvPr>
+          <p:cNvSpPr txBox="1"/>
+          <p:nvPr/>
+        </p:nvSpPr>
+        <p:spPr>
+          <a:xfrm>
+            <a:off x="535259" y="5765180"/>
+            <a:ext cx="7605131" cy="584775"/>
+          </a:xfrm>
+          <a:prstGeom prst="rect">
+            <a:avLst/>
+          </a:prstGeom>
+          <a:noFill/>
+        </p:spPr>
+        <p:txBody>
+          <a:bodyPr wrap="square" rtlCol="0">
+            <a:spAutoFit/>
+          </a:bodyPr>
+          <a:lstStyle/>
+          <a:p>
+            <a:pPr marL="285750" indent="-285750">
+              <a:buFont typeface="Arial" panose="020B0604020202020204" pitchFamily="34" charset="0"/>
+              <a:buChar char="•"/>
+            </a:pPr>
+            <a:r>
+              <a:rPr lang="en-BE" sz="1600" b="1" i="1" dirty="0"/>
+              <a:t>Action Item #5</a:t>
+            </a:r>
+            <a:r>
+              <a:rPr lang="en-BE" sz="1600" dirty="0"/>
+              <a:t>: </a:t>
+            </a:r>
+            <a:r>
+              <a:rPr lang="en-BE" sz="1600" b="1" i="1" dirty="0"/>
+              <a:t>The architecture of CCB Bioinformatics Platform node must be determined. There are trade-offs between purchasing a server vs a cloud solution</a:t>
+            </a:r>
+            <a:endParaRPr lang="en-BE" sz="1600" i="1" dirty="0"/>
+          </a:p>
+        </p:txBody>
+      </p:sp>
+    </p:spTree>
+    <p:extLst>
+      <p:ext uri="{BB962C8B-B14F-4D97-AF65-F5344CB8AC3E}">
+        <p14:creationId xmlns:p14="http://schemas.microsoft.com/office/powerpoint/2010/main" val="338286069"/>
+      </p:ext>
+    </p:extLst>
+  </p:cSld>
+  <p:clrMapOvr>
+    <a:masterClrMapping/>
+  </p:clrMapOvr>
+</p:sld>
+</file>
+
+<file path=ppt/slides/slide7.xml><?xml version="1.0" encoding="utf-8"?>
+<p:sld xmlns:a="http://schemas.openxmlformats.org/drawingml/2006/main" xmlns:r="http://schemas.openxmlformats.org/officeDocument/2006/relationships" xmlns:p="http://schemas.openxmlformats.org/presentationml/2006/main">
+  <p:cSld>
+    <p:spTree>
+      <p:nvGrpSpPr>
+        <p:cNvPr id="1" name=""/>
+        <p:cNvGrpSpPr/>
+        <p:nvPr/>
+      </p:nvGrpSpPr>
+      <p:grpSpPr>
+        <a:xfrm>
+          <a:off x="0" y="0"/>
+          <a:ext cx="0" cy="0"/>
+          <a:chOff x="0" y="0"/>
+          <a:chExt cx="0" cy="0"/>
+        </a:xfrm>
+      </p:grpSpPr>
+      <p:sp>
+        <p:nvSpPr>
+          <p:cNvPr id="2" name="Content Placeholder 1">
+            <a:extLst>
+              <a:ext uri="{FF2B5EF4-FFF2-40B4-BE49-F238E27FC236}">
+                <a16:creationId xmlns:a16="http://schemas.microsoft.com/office/drawing/2014/main" id="{06110BFD-F82D-D64D-87BB-809560D77E28}"/>
+              </a:ext>
+            </a:extLst>
+          </p:cNvPr>
+          <p:cNvSpPr>
+            <a:spLocks noGrp="1"/>
+          </p:cNvSpPr>
+          <p:nvPr>
+            <p:ph idx="1"/>
+          </p:nvPr>
+        </p:nvSpPr>
+        <p:spPr>
+          <a:xfrm>
+            <a:off x="457200" y="1600200"/>
+            <a:ext cx="8251902" cy="4525963"/>
+          </a:xfrm>
+        </p:spPr>
+        <p:txBody>
+          <a:bodyPr/>
+          <a:lstStyle/>
+          <a:p>
+            <a:r>
+              <a:rPr lang="en-BE" sz="1500" dirty="0"/>
+              <a:t>The CCB Bioinformatics Platform will implement the </a:t>
+            </a:r>
+            <a:r>
+              <a:rPr lang="en-BE" sz="1500" dirty="0">
+                <a:hlinkClick r:id="rId2"/>
+              </a:rPr>
+              <a:t>project management system OpenProject </a:t>
+            </a:r>
+            <a:r>
+              <a:rPr lang="en-BE" sz="1500" dirty="0"/>
+              <a:t>displaying forecasts of project hours, providing a transparent format to communicate a timeline outline when stakeholders can reasonably expect results</a:t>
+            </a:r>
+          </a:p>
+          <a:p>
+            <a:endParaRPr lang="en-BE" sz="1500" dirty="0"/>
+          </a:p>
+          <a:p>
+            <a:r>
+              <a:rPr lang="en-BE" sz="1500" dirty="0"/>
+              <a:t>In the interest of fairness to the commitments to other labs, newly requested projects from a given lab will typically be addressed after current projects from that same lab have been completed. Please inform the platform of upcoming deadlines far in advance whenever possible</a:t>
+            </a:r>
+          </a:p>
+          <a:p>
+            <a:endParaRPr lang="en-BE" sz="1500" dirty="0"/>
+          </a:p>
+          <a:p>
+            <a:r>
+              <a:rPr lang="en-BE" sz="1500" dirty="0"/>
+              <a:t>In order to make the best use of bioinformatic infrastructure made available by the CCB Platform, we strongly encourage lab members such as PhD students to enroll in bioinformatic courses and symposia to become familiar with R/Python, bash and Bioconductor to become more proficient at using bioinformatic tools</a:t>
+            </a:r>
+          </a:p>
+          <a:p>
+            <a:endParaRPr lang="en-BE" sz="1500" dirty="0"/>
+          </a:p>
+          <a:p>
+            <a:r>
+              <a:rPr lang="en-BE" sz="1500" dirty="0"/>
+              <a:t>In the interest of time efficiency, data should be presented to the CCB platform rather than requesting the CCB platform to search for the desired data (i.e. please send url links, GSE accession numbers or directory paths to data whenever possible)</a:t>
+            </a:r>
+          </a:p>
+          <a:p>
+            <a:endParaRPr lang="en-BE" sz="1500" dirty="0"/>
+          </a:p>
+          <a:p>
+            <a:r>
+              <a:rPr lang="en-BE" sz="1500" dirty="0"/>
+              <a:t>Lastly, if you use work from the CCB Bioinformatics Platform in a publication, please cite the author!</a:t>
+            </a:r>
+          </a:p>
+        </p:txBody>
+      </p:sp>
+      <p:sp>
+        <p:nvSpPr>
+          <p:cNvPr id="3" name="Title 2">
+            <a:extLst>
+              <a:ext uri="{FF2B5EF4-FFF2-40B4-BE49-F238E27FC236}">
+                <a16:creationId xmlns:a16="http://schemas.microsoft.com/office/drawing/2014/main" id="{0BB391C9-C7AA-EA48-BD03-81EB810F3E0B}"/>
+              </a:ext>
+            </a:extLst>
+          </p:cNvPr>
+          <p:cNvSpPr>
+            <a:spLocks noGrp="1"/>
+          </p:cNvSpPr>
+          <p:nvPr>
+            <p:ph type="title"/>
+          </p:nvPr>
+        </p:nvSpPr>
+        <p:spPr/>
+        <p:txBody>
+          <a:bodyPr/>
+          <a:lstStyle/>
+          <a:p>
+            <a:r>
+              <a:rPr lang="en-BE" dirty="0"/>
+              <a:t>Closing Remarks</a:t>
             </a:r>
           </a:p>
         </p:txBody>
@@ -14830,6 +15277,158 @@
     <p:extLst>
       <p:ext uri="{BB962C8B-B14F-4D97-AF65-F5344CB8AC3E}">
         <p14:creationId xmlns:p14="http://schemas.microsoft.com/office/powerpoint/2010/main" val="2539487623"/>
+      </p:ext>
+    </p:extLst>
+  </p:cSld>
+  <p:clrMapOvr>
+    <a:masterClrMapping/>
+  </p:clrMapOvr>
+</p:sld>
+</file>
+
+<file path=ppt/slides/slide8.xml><?xml version="1.0" encoding="utf-8"?>
+<p:sld xmlns:a="http://schemas.openxmlformats.org/drawingml/2006/main" xmlns:r="http://schemas.openxmlformats.org/officeDocument/2006/relationships" xmlns:p="http://schemas.openxmlformats.org/presentationml/2006/main">
+  <p:cSld>
+    <p:spTree>
+      <p:nvGrpSpPr>
+        <p:cNvPr id="1" name=""/>
+        <p:cNvGrpSpPr/>
+        <p:nvPr/>
+      </p:nvGrpSpPr>
+      <p:grpSpPr>
+        <a:xfrm>
+          <a:off x="0" y="0"/>
+          <a:ext cx="0" cy="0"/>
+          <a:chOff x="0" y="0"/>
+          <a:chExt cx="0" cy="0"/>
+        </a:xfrm>
+      </p:grpSpPr>
+      <p:sp>
+        <p:nvSpPr>
+          <p:cNvPr id="2" name="Content Placeholder 1">
+            <a:extLst>
+              <a:ext uri="{FF2B5EF4-FFF2-40B4-BE49-F238E27FC236}">
+                <a16:creationId xmlns:a16="http://schemas.microsoft.com/office/drawing/2014/main" id="{06110BFD-F82D-D64D-87BB-809560D77E28}"/>
+              </a:ext>
+            </a:extLst>
+          </p:cNvPr>
+          <p:cNvSpPr>
+            <a:spLocks noGrp="1"/>
+          </p:cNvSpPr>
+          <p:nvPr>
+            <p:ph idx="1"/>
+          </p:nvPr>
+        </p:nvSpPr>
+        <p:spPr>
+          <a:xfrm>
+            <a:off x="457199" y="1600200"/>
+            <a:ext cx="8207299" cy="4525963"/>
+          </a:xfrm>
+        </p:spPr>
+        <p:txBody>
+          <a:bodyPr/>
+          <a:lstStyle/>
+          <a:p>
+            <a:r>
+              <a:rPr lang="en-BE" sz="1800" b="1" i="1" dirty="0"/>
+              <a:t>Action Item #1: A data storage solution is needed to meet the needs of various labs and the CCB Bioinformatics Platform</a:t>
+            </a:r>
+          </a:p>
+          <a:p>
+            <a:endParaRPr lang="en-BE" sz="1800" b="1" i="1" dirty="0"/>
+          </a:p>
+          <a:p>
+            <a:r>
+              <a:rPr lang="en-BE" sz="1800" b="1" i="1" dirty="0"/>
+              <a:t>Action Item #2: Strive towards an equitable distribution of usage of CCB Bioinformatics Platform resources and develop scheduled time to develop new services </a:t>
+            </a:r>
+            <a:endParaRPr lang="en-BE" sz="1800" i="1" dirty="0"/>
+          </a:p>
+          <a:p>
+            <a:endParaRPr lang="en-BE" sz="1800" b="1" i="1" dirty="0"/>
+          </a:p>
+          <a:p>
+            <a:r>
+              <a:rPr lang="en-BE" sz="1800" b="1" i="1" dirty="0"/>
+              <a:t>Action Item #3: A formal system of CCB Bioinformatics Platform requests may need to be implemented</a:t>
+            </a:r>
+          </a:p>
+          <a:p>
+            <a:endParaRPr lang="en-BE" sz="1800" b="1" i="1" dirty="0"/>
+          </a:p>
+          <a:p>
+            <a:r>
+              <a:rPr lang="en-BE" sz="1800" b="1" i="1" dirty="0"/>
+              <a:t>Action Item #4</a:t>
+            </a:r>
+            <a:r>
+              <a:rPr lang="en-BE" sz="1800" i="1" dirty="0"/>
+              <a:t>: </a:t>
+            </a:r>
+            <a:r>
+              <a:rPr lang="en-BE" sz="1800" b="1" i="1" dirty="0"/>
+              <a:t>W</a:t>
+            </a:r>
+            <a:r>
+              <a:rPr lang="en-GB" sz="1800" b="1" i="1" dirty="0"/>
+              <a:t>ha</a:t>
+            </a:r>
+            <a:r>
+              <a:rPr lang="en-BE" sz="1800" b="1" i="1" dirty="0"/>
+              <a:t>t are the requirements of a CCB Bioinformatics Platform node that would best meet the computational and storage needs of the various CCB groups?</a:t>
+            </a:r>
+          </a:p>
+          <a:p>
+            <a:endParaRPr lang="en-BE" sz="1800" b="1" i="1" dirty="0"/>
+          </a:p>
+          <a:p>
+            <a:r>
+              <a:rPr lang="en-BE" sz="1800" b="1" i="1" dirty="0"/>
+              <a:t>Action Item #5</a:t>
+            </a:r>
+            <a:r>
+              <a:rPr lang="en-BE" sz="1800" i="1" dirty="0"/>
+              <a:t>: </a:t>
+            </a:r>
+            <a:r>
+              <a:rPr lang="en-BE" sz="1800" b="1" i="1" dirty="0"/>
+              <a:t>The architecture of CCB Bioinformatics Platform node must be determined (server vs cloud)</a:t>
+            </a:r>
+          </a:p>
+        </p:txBody>
+      </p:sp>
+      <p:sp>
+        <p:nvSpPr>
+          <p:cNvPr id="3" name="Title 2">
+            <a:extLst>
+              <a:ext uri="{FF2B5EF4-FFF2-40B4-BE49-F238E27FC236}">
+                <a16:creationId xmlns:a16="http://schemas.microsoft.com/office/drawing/2014/main" id="{0BB391C9-C7AA-EA48-BD03-81EB810F3E0B}"/>
+              </a:ext>
+            </a:extLst>
+          </p:cNvPr>
+          <p:cNvSpPr>
+            <a:spLocks noGrp="1"/>
+          </p:cNvSpPr>
+          <p:nvPr>
+            <p:ph type="title"/>
+          </p:nvPr>
+        </p:nvSpPr>
+        <p:spPr/>
+        <p:txBody>
+          <a:bodyPr/>
+          <a:lstStyle/>
+          <a:p>
+            <a:r>
+              <a:rPr lang="en-BE" dirty="0"/>
+              <a:t>Summary of Action Items</a:t>
+            </a:r>
+          </a:p>
+        </p:txBody>
+      </p:sp>
+    </p:spTree>
+    <p:extLst>
+      <p:ext uri="{BB962C8B-B14F-4D97-AF65-F5344CB8AC3E}">
+        <p14:creationId xmlns:p14="http://schemas.microsoft.com/office/powerpoint/2010/main" val="137422245"/>
       </p:ext>
     </p:extLst>
   </p:cSld>

</xml_diff>